<commit_message>
Convert docx -> pptx
</commit_message>
<xml_diff>
--- a/chentsov/dombai/docx/dombai-chentsov.pptx
+++ b/chentsov/dombai/docx/dombai-chentsov.pptx
@@ -7,7 +7,17 @@
   <p:sldIdLst>
     <p:sldId id="256" r:id="rId2"/>
     <p:sldId id="293" r:id="rId3"/>
-    <p:sldId id="259" r:id="rId4"/>
+    <p:sldId id="294" r:id="rId4"/>
+    <p:sldId id="295" r:id="rId5"/>
+    <p:sldId id="296" r:id="rId6"/>
+    <p:sldId id="297" r:id="rId7"/>
+    <p:sldId id="298" r:id="rId8"/>
+    <p:sldId id="299" r:id="rId9"/>
+    <p:sldId id="300" r:id="rId10"/>
+    <p:sldId id="301" r:id="rId11"/>
+    <p:sldId id="303" r:id="rId12"/>
+    <p:sldId id="304" r:id="rId13"/>
+    <p:sldId id="259" r:id="rId14"/>
   </p:sldIdLst>
   <p:sldSz cx="9144000" cy="6858000" type="screen4x3"/>
   <p:notesSz cx="6858000" cy="9144000"/>
@@ -117,6 +127,16 @@
         <p14:section name="Основная часть" id="{93878CE5-A944-47CD-A435-4106DB216F18}">
           <p14:sldIdLst>
             <p14:sldId id="293"/>
+            <p14:sldId id="294"/>
+            <p14:sldId id="295"/>
+            <p14:sldId id="296"/>
+            <p14:sldId id="297"/>
+            <p14:sldId id="298"/>
+            <p14:sldId id="299"/>
+            <p14:sldId id="300"/>
+            <p14:sldId id="301"/>
+            <p14:sldId id="303"/>
+            <p14:sldId id="304"/>
           </p14:sldIdLst>
         </p14:section>
         <p14:section name="Завершение" id="{B0E38EE0-5FF2-459B-A119-F4109678D724}">
@@ -4738,7 +4758,7 @@
 </p:sld>
 </file>
 
-<file path=ppt/slides/slide2.xml><?xml version="1.0" encoding="utf-8"?>
+<file path=ppt/slides/slide10.xml><?xml version="1.0" encoding="utf-8"?>
 <p:sld xmlns:a="http://schemas.openxmlformats.org/drawingml/2006/main" xmlns:r="http://schemas.openxmlformats.org/officeDocument/2006/relationships" xmlns:p="http://schemas.openxmlformats.org/presentationml/2006/main">
   <p:cSld>
     <p:spTree>
@@ -4757,35 +4777,10 @@
       </p:grpSpPr>
       <p:sp>
         <p:nvSpPr>
-          <p:cNvPr id="2" name="Заголовок 1">
-            <a:extLst>
-              <a:ext uri="{FF2B5EF4-FFF2-40B4-BE49-F238E27FC236}">
-                <a16:creationId xmlns:a16="http://schemas.microsoft.com/office/drawing/2014/main" id="{6FB0783A-9780-48DB-91B4-609021B1D03E}"/>
-              </a:ext>
-            </a:extLst>
-          </p:cNvPr>
-          <p:cNvSpPr>
-            <a:spLocks noGrp="1"/>
-          </p:cNvSpPr>
-          <p:nvPr>
-            <p:ph type="title"/>
-          </p:nvPr>
-        </p:nvSpPr>
-        <p:spPr/>
-        <p:txBody>
-          <a:bodyPr/>
-          <a:lstStyle/>
-          <a:p>
-            <a:endParaRPr lang="ru-RU"/>
-          </a:p>
-        </p:txBody>
-      </p:sp>
-      <p:sp>
-        <p:nvSpPr>
           <p:cNvPr id="3" name="Объект 2">
             <a:extLst>
               <a:ext uri="{FF2B5EF4-FFF2-40B4-BE49-F238E27FC236}">
-                <a16:creationId xmlns:a16="http://schemas.microsoft.com/office/drawing/2014/main" id="{605A34B0-48B2-4F2E-B448-B6FAD6840879}"/>
+                <a16:creationId xmlns:a16="http://schemas.microsoft.com/office/drawing/2014/main" id="{F325F77E-244F-45E2-A76A-F6044791FDFF}"/>
               </a:ext>
             </a:extLst>
           </p:cNvPr>
@@ -4796,19 +4791,133 @@
             <p:ph sz="quarter" idx="13"/>
           </p:nvPr>
         </p:nvSpPr>
-        <p:spPr/>
-        <p:txBody>
-          <a:bodyPr/>
-          <a:lstStyle/>
-          <a:p>
-            <a:endParaRPr lang="ru-RU"/>
+        <p:spPr>
+          <a:xfrm>
+            <a:off x="127000" y="1307252"/>
+            <a:ext cx="8610600" cy="5195147"/>
+          </a:xfrm>
+        </p:spPr>
+        <p:txBody>
+          <a:bodyPr>
+            <a:normAutofit lnSpcReduction="10000"/>
+          </a:bodyPr>
+          <a:lstStyle/>
+          <a:p>
+            <a:pPr marL="45720" indent="0" algn="just">
+              <a:buNone/>
+            </a:pPr>
+            <a:r>
+              <a:rPr lang="ru-RU" b="1" dirty="0"/>
+              <a:t>3. Построение системы слоев функции Беллмана</a:t>
+            </a:r>
+          </a:p>
+          <a:p>
+            <a:pPr marL="45720" indent="0" algn="just">
+              <a:buNone/>
+            </a:pPr>
+            <a:r>
+              <a:rPr lang="ru-RU" dirty="0"/>
+              <a:t>На основе уравнения Беллмана (вид которого нам теперь известен) конструируем систему преобразований, действующих на функции, определяемые на слоях пространства позиций. Простейший (терминальный) слой определяется терминальной компонентой аддитивного критерия, а далее «включается» рекуррентная процедура, имеющая своей логической основой уравнение Беллмана.</a:t>
+            </a:r>
+          </a:p>
+          <a:p>
+            <a:pPr marL="45720" indent="0" algn="just">
+              <a:buNone/>
+            </a:pPr>
+            <a:r>
+              <a:rPr lang="ru-RU" dirty="0"/>
+              <a:t> Функции, реализуемые данной процедурой, являются сужениями нашей основной функции Беллмана. В частности, последний этап упомянутой рекуррентной процедуры определяет экстремум задачи маршрутизации с фиксированной точкой старта. Это позволяет </a:t>
+            </a:r>
+            <a:r>
+              <a:rPr lang="ru-RU" dirty="0" err="1"/>
+              <a:t>прооптимизировать</a:t>
+            </a:r>
+            <a:r>
+              <a:rPr lang="ru-RU" dirty="0"/>
+              <a:t> точку старта, что определяет содержание следующего этапа</a:t>
+            </a:r>
+          </a:p>
+        </p:txBody>
+      </p:sp>
+      <p:sp>
+        <p:nvSpPr>
+          <p:cNvPr id="4" name="TextBox 3">
+            <a:extLst>
+              <a:ext uri="{FF2B5EF4-FFF2-40B4-BE49-F238E27FC236}">
+                <a16:creationId xmlns:a16="http://schemas.microsoft.com/office/drawing/2014/main" id="{771DBBFA-A1F4-4A32-AB22-860D4F7F709F}"/>
+              </a:ext>
+            </a:extLst>
+          </p:cNvPr>
+          <p:cNvSpPr txBox="1"/>
+          <p:nvPr/>
+        </p:nvSpPr>
+        <p:spPr>
+          <a:xfrm>
+            <a:off x="3821502" y="219759"/>
+            <a:ext cx="5070978" cy="646331"/>
+          </a:xfrm>
+          <a:prstGeom prst="rect">
+            <a:avLst/>
+          </a:prstGeom>
+          <a:noFill/>
+        </p:spPr>
+        <p:txBody>
+          <a:bodyPr wrap="square" rtlCol="0">
+            <a:spAutoFit/>
+            <a:scene3d>
+              <a:camera prst="orthographicFront"/>
+              <a:lightRig rig="soft" dir="tl">
+                <a:rot lat="0" lon="0" rev="0"/>
+              </a:lightRig>
+            </a:scene3d>
+            <a:sp3d contourW="25400" prstMaterial="matte">
+              <a:bevelT w="25400" h="55880" prst="artDeco"/>
+              <a:contourClr>
+                <a:schemeClr val="accent2">
+                  <a:tint val="20000"/>
+                </a:schemeClr>
+              </a:contourClr>
+            </a:sp3d>
+          </a:bodyPr>
+          <a:lstStyle/>
+          <a:p>
+            <a:pPr algn="r"/>
+            <a:r>
+              <a:rPr lang="ru-RU" sz="3600" b="1" spc="50" dirty="0">
+                <a:ln w="11430"/>
+                <a:gradFill>
+                  <a:gsLst>
+                    <a:gs pos="25000">
+                      <a:schemeClr val="accent2">
+                        <a:satMod val="155000"/>
+                      </a:schemeClr>
+                    </a:gs>
+                    <a:gs pos="100000">
+                      <a:schemeClr val="accent2">
+                        <a:shade val="45000"/>
+                        <a:satMod val="165000"/>
+                      </a:schemeClr>
+                    </a:gs>
+                  </a:gsLst>
+                  <a:lin ang="5400000"/>
+                </a:gradFill>
+                <a:effectLst>
+                  <a:outerShdw blurRad="76200" dist="50800" dir="5400000" algn="tl" rotWithShape="0">
+                    <a:srgbClr val="000000">
+                      <a:alpha val="65000"/>
+                    </a:srgbClr>
+                  </a:outerShdw>
+                </a:effectLst>
+              </a:rPr>
+              <a:t>Структура алгоритма</a:t>
+            </a:r>
           </a:p>
         </p:txBody>
       </p:sp>
     </p:spTree>
     <p:extLst>
       <p:ext uri="{BB962C8B-B14F-4D97-AF65-F5344CB8AC3E}">
-        <p14:creationId xmlns:p14="http://schemas.microsoft.com/office/powerpoint/2010/main" val="255341494"/>
+        <p14:creationId xmlns:p14="http://schemas.microsoft.com/office/powerpoint/2010/main" val="879265822"/>
       </p:ext>
     </p:extLst>
   </p:cSld>
@@ -4818,7 +4927,311 @@
 </p:sld>
 </file>
 
-<file path=ppt/slides/slide3.xml><?xml version="1.0" encoding="utf-8"?>
+<file path=ppt/slides/slide11.xml><?xml version="1.0" encoding="utf-8"?>
+<p:sld xmlns:a="http://schemas.openxmlformats.org/drawingml/2006/main" xmlns:r="http://schemas.openxmlformats.org/officeDocument/2006/relationships" xmlns:p="http://schemas.openxmlformats.org/presentationml/2006/main">
+  <p:cSld>
+    <p:spTree>
+      <p:nvGrpSpPr>
+        <p:cNvPr id="1" name=""/>
+        <p:cNvGrpSpPr/>
+        <p:nvPr/>
+      </p:nvGrpSpPr>
+      <p:grpSpPr>
+        <a:xfrm>
+          <a:off x="0" y="0"/>
+          <a:ext cx="0" cy="0"/>
+          <a:chOff x="0" y="0"/>
+          <a:chExt cx="0" cy="0"/>
+        </a:xfrm>
+      </p:grpSpPr>
+      <p:sp>
+        <p:nvSpPr>
+          <p:cNvPr id="3" name="Объект 2">
+            <a:extLst>
+              <a:ext uri="{FF2B5EF4-FFF2-40B4-BE49-F238E27FC236}">
+                <a16:creationId xmlns:a16="http://schemas.microsoft.com/office/drawing/2014/main" id="{F325F77E-244F-45E2-A76A-F6044791FDFF}"/>
+              </a:ext>
+            </a:extLst>
+          </p:cNvPr>
+          <p:cNvSpPr>
+            <a:spLocks noGrp="1"/>
+          </p:cNvSpPr>
+          <p:nvPr>
+            <p:ph sz="quarter" idx="13"/>
+          </p:nvPr>
+        </p:nvSpPr>
+        <p:spPr>
+          <a:xfrm>
+            <a:off x="127000" y="1307252"/>
+            <a:ext cx="8610600" cy="5195147"/>
+          </a:xfrm>
+        </p:spPr>
+        <p:txBody>
+          <a:bodyPr>
+            <a:normAutofit/>
+          </a:bodyPr>
+          <a:lstStyle/>
+          <a:p>
+            <a:pPr marL="45720" indent="0" algn="just">
+              <a:buNone/>
+            </a:pPr>
+            <a:r>
+              <a:rPr lang="ru-RU" b="1" dirty="0"/>
+              <a:t>4. Оптимизация точки старта</a:t>
+            </a:r>
+          </a:p>
+          <a:p>
+            <a:pPr marL="45720" indent="0" algn="just">
+              <a:buNone/>
+            </a:pPr>
+            <a:r>
+              <a:rPr lang="ru-RU" dirty="0"/>
+              <a:t>После реализации последнего слоя функции Беллмана, отвечающего полному списку заданий, мы располагаем зависимостью экстремума задачи от точки старта. Минимизируя эту зависимость (а это - совсем несложная процедура), мы определяем глобальный экстремум и оптимальную (по результату) точку старта</a:t>
+            </a:r>
+          </a:p>
+        </p:txBody>
+      </p:sp>
+      <p:sp>
+        <p:nvSpPr>
+          <p:cNvPr id="4" name="TextBox 3">
+            <a:extLst>
+              <a:ext uri="{FF2B5EF4-FFF2-40B4-BE49-F238E27FC236}">
+                <a16:creationId xmlns:a16="http://schemas.microsoft.com/office/drawing/2014/main" id="{771DBBFA-A1F4-4A32-AB22-860D4F7F709F}"/>
+              </a:ext>
+            </a:extLst>
+          </p:cNvPr>
+          <p:cNvSpPr txBox="1"/>
+          <p:nvPr/>
+        </p:nvSpPr>
+        <p:spPr>
+          <a:xfrm>
+            <a:off x="3821502" y="219759"/>
+            <a:ext cx="5070978" cy="646331"/>
+          </a:xfrm>
+          <a:prstGeom prst="rect">
+            <a:avLst/>
+          </a:prstGeom>
+          <a:noFill/>
+        </p:spPr>
+        <p:txBody>
+          <a:bodyPr wrap="square" rtlCol="0">
+            <a:spAutoFit/>
+            <a:scene3d>
+              <a:camera prst="orthographicFront"/>
+              <a:lightRig rig="soft" dir="tl">
+                <a:rot lat="0" lon="0" rev="0"/>
+              </a:lightRig>
+            </a:scene3d>
+            <a:sp3d contourW="25400" prstMaterial="matte">
+              <a:bevelT w="25400" h="55880" prst="artDeco"/>
+              <a:contourClr>
+                <a:schemeClr val="accent2">
+                  <a:tint val="20000"/>
+                </a:schemeClr>
+              </a:contourClr>
+            </a:sp3d>
+          </a:bodyPr>
+          <a:lstStyle/>
+          <a:p>
+            <a:pPr algn="r"/>
+            <a:r>
+              <a:rPr lang="ru-RU" sz="3600" b="1" spc="50" dirty="0">
+                <a:ln w="11430"/>
+                <a:gradFill>
+                  <a:gsLst>
+                    <a:gs pos="25000">
+                      <a:schemeClr val="accent2">
+                        <a:satMod val="155000"/>
+                      </a:schemeClr>
+                    </a:gs>
+                    <a:gs pos="100000">
+                      <a:schemeClr val="accent2">
+                        <a:shade val="45000"/>
+                        <a:satMod val="165000"/>
+                      </a:schemeClr>
+                    </a:gs>
+                  </a:gsLst>
+                  <a:lin ang="5400000"/>
+                </a:gradFill>
+                <a:effectLst>
+                  <a:outerShdw blurRad="76200" dist="50800" dir="5400000" algn="tl" rotWithShape="0">
+                    <a:srgbClr val="000000">
+                      <a:alpha val="65000"/>
+                    </a:srgbClr>
+                  </a:outerShdw>
+                </a:effectLst>
+              </a:rPr>
+              <a:t>Структура алгоритма</a:t>
+            </a:r>
+          </a:p>
+        </p:txBody>
+      </p:sp>
+    </p:spTree>
+    <p:extLst>
+      <p:ext uri="{BB962C8B-B14F-4D97-AF65-F5344CB8AC3E}">
+        <p14:creationId xmlns:p14="http://schemas.microsoft.com/office/powerpoint/2010/main" val="141634978"/>
+      </p:ext>
+    </p:extLst>
+  </p:cSld>
+  <p:clrMapOvr>
+    <a:masterClrMapping/>
+  </p:clrMapOvr>
+</p:sld>
+</file>
+
+<file path=ppt/slides/slide12.xml><?xml version="1.0" encoding="utf-8"?>
+<p:sld xmlns:a="http://schemas.openxmlformats.org/drawingml/2006/main" xmlns:r="http://schemas.openxmlformats.org/officeDocument/2006/relationships" xmlns:p="http://schemas.openxmlformats.org/presentationml/2006/main">
+  <p:cSld>
+    <p:spTree>
+      <p:nvGrpSpPr>
+        <p:cNvPr id="1" name=""/>
+        <p:cNvGrpSpPr/>
+        <p:nvPr/>
+      </p:nvGrpSpPr>
+      <p:grpSpPr>
+        <a:xfrm>
+          <a:off x="0" y="0"/>
+          <a:ext cx="0" cy="0"/>
+          <a:chOff x="0" y="0"/>
+          <a:chExt cx="0" cy="0"/>
+        </a:xfrm>
+      </p:grpSpPr>
+      <p:sp>
+        <p:nvSpPr>
+          <p:cNvPr id="3" name="Объект 2">
+            <a:extLst>
+              <a:ext uri="{FF2B5EF4-FFF2-40B4-BE49-F238E27FC236}">
+                <a16:creationId xmlns:a16="http://schemas.microsoft.com/office/drawing/2014/main" id="{F325F77E-244F-45E2-A76A-F6044791FDFF}"/>
+              </a:ext>
+            </a:extLst>
+          </p:cNvPr>
+          <p:cNvSpPr>
+            <a:spLocks noGrp="1"/>
+          </p:cNvSpPr>
+          <p:nvPr>
+            <p:ph sz="quarter" idx="13"/>
+          </p:nvPr>
+        </p:nvSpPr>
+        <p:spPr>
+          <a:xfrm>
+            <a:off x="127000" y="1307252"/>
+            <a:ext cx="8610600" cy="5195147"/>
+          </a:xfrm>
+        </p:spPr>
+        <p:txBody>
+          <a:bodyPr>
+            <a:normAutofit/>
+          </a:bodyPr>
+          <a:lstStyle/>
+          <a:p>
+            <a:pPr marL="45720" lvl="0" indent="0">
+              <a:buNone/>
+            </a:pPr>
+            <a:r>
+              <a:rPr lang="ru-RU" b="1" dirty="0"/>
+              <a:t>5. Построение оптимального решения</a:t>
+            </a:r>
+          </a:p>
+          <a:p>
+            <a:pPr marL="45720" lvl="0" indent="0" algn="just">
+              <a:buNone/>
+            </a:pPr>
+            <a:r>
+              <a:rPr lang="ru-RU" dirty="0"/>
+              <a:t>Фиксируем оптимальную точку старта, найденную на предыдущем этапе. Далее, используя стандартную в теории ДП процедуру пошагового выбора индексов и упорядоченных пар с элементами в виде точек врезки и точек выключения инструмента, определяем допустимое решение, оптимальное для данной точки старта. Дополняя этой точкой полученное решение, реализованное в виде упорядоченной пары маршрут-траектория, получаем оптимальный маршрутный процесс. В частности, в первом примере такой процесс был построен и указана оптимальная точка старта. Во втором примере, как отмечено выше, оптимизация точки старта не осуществлялась.</a:t>
+            </a:r>
+          </a:p>
+        </p:txBody>
+      </p:sp>
+      <p:sp>
+        <p:nvSpPr>
+          <p:cNvPr id="4" name="TextBox 3">
+            <a:extLst>
+              <a:ext uri="{FF2B5EF4-FFF2-40B4-BE49-F238E27FC236}">
+                <a16:creationId xmlns:a16="http://schemas.microsoft.com/office/drawing/2014/main" id="{771DBBFA-A1F4-4A32-AB22-860D4F7F709F}"/>
+              </a:ext>
+            </a:extLst>
+          </p:cNvPr>
+          <p:cNvSpPr txBox="1"/>
+          <p:nvPr/>
+        </p:nvSpPr>
+        <p:spPr>
+          <a:xfrm>
+            <a:off x="3821502" y="219759"/>
+            <a:ext cx="5070978" cy="646331"/>
+          </a:xfrm>
+          <a:prstGeom prst="rect">
+            <a:avLst/>
+          </a:prstGeom>
+          <a:noFill/>
+        </p:spPr>
+        <p:txBody>
+          <a:bodyPr wrap="square" rtlCol="0">
+            <a:spAutoFit/>
+            <a:scene3d>
+              <a:camera prst="orthographicFront"/>
+              <a:lightRig rig="soft" dir="tl">
+                <a:rot lat="0" lon="0" rev="0"/>
+              </a:lightRig>
+            </a:scene3d>
+            <a:sp3d contourW="25400" prstMaterial="matte">
+              <a:bevelT w="25400" h="55880" prst="artDeco"/>
+              <a:contourClr>
+                <a:schemeClr val="accent2">
+                  <a:tint val="20000"/>
+                </a:schemeClr>
+              </a:contourClr>
+            </a:sp3d>
+          </a:bodyPr>
+          <a:lstStyle/>
+          <a:p>
+            <a:pPr algn="r"/>
+            <a:r>
+              <a:rPr lang="ru-RU" sz="3600" b="1" spc="50" dirty="0">
+                <a:ln w="11430"/>
+                <a:gradFill>
+                  <a:gsLst>
+                    <a:gs pos="25000">
+                      <a:schemeClr val="accent2">
+                        <a:satMod val="155000"/>
+                      </a:schemeClr>
+                    </a:gs>
+                    <a:gs pos="100000">
+                      <a:schemeClr val="accent2">
+                        <a:shade val="45000"/>
+                        <a:satMod val="165000"/>
+                      </a:schemeClr>
+                    </a:gs>
+                  </a:gsLst>
+                  <a:lin ang="5400000"/>
+                </a:gradFill>
+                <a:effectLst>
+                  <a:outerShdw blurRad="76200" dist="50800" dir="5400000" algn="tl" rotWithShape="0">
+                    <a:srgbClr val="000000">
+                      <a:alpha val="65000"/>
+                    </a:srgbClr>
+                  </a:outerShdw>
+                </a:effectLst>
+              </a:rPr>
+              <a:t>Структура алгоритма</a:t>
+            </a:r>
+          </a:p>
+        </p:txBody>
+      </p:sp>
+    </p:spTree>
+    <p:extLst>
+      <p:ext uri="{BB962C8B-B14F-4D97-AF65-F5344CB8AC3E}">
+        <p14:creationId xmlns:p14="http://schemas.microsoft.com/office/powerpoint/2010/main" val="3745611278"/>
+      </p:ext>
+    </p:extLst>
+  </p:cSld>
+  <p:clrMapOvr>
+    <a:masterClrMapping/>
+  </p:clrMapOvr>
+</p:sld>
+</file>
+
+<file path=ppt/slides/slide13.xml><?xml version="1.0" encoding="utf-8"?>
 <p:sld xmlns:a="http://schemas.openxmlformats.org/drawingml/2006/main" xmlns:r="http://schemas.openxmlformats.org/officeDocument/2006/relationships" xmlns:p="http://schemas.openxmlformats.org/presentationml/2006/main">
   <p:cSld>
     <p:spTree>
@@ -5217,6 +5630,2230 @@
     <p:extLst>
       <p:ext uri="{BB962C8B-B14F-4D97-AF65-F5344CB8AC3E}">
         <p14:creationId xmlns:p14="http://schemas.microsoft.com/office/powerpoint/2010/main" val="272427829"/>
+      </p:ext>
+    </p:extLst>
+  </p:cSld>
+  <p:clrMapOvr>
+    <a:masterClrMapping/>
+  </p:clrMapOvr>
+</p:sld>
+</file>
+
+<file path=ppt/slides/slide2.xml><?xml version="1.0" encoding="utf-8"?>
+<p:sld xmlns:a="http://schemas.openxmlformats.org/drawingml/2006/main" xmlns:r="http://schemas.openxmlformats.org/officeDocument/2006/relationships" xmlns:p="http://schemas.openxmlformats.org/presentationml/2006/main">
+  <p:cSld>
+    <p:spTree>
+      <p:nvGrpSpPr>
+        <p:cNvPr id="1" name=""/>
+        <p:cNvGrpSpPr/>
+        <p:nvPr/>
+      </p:nvGrpSpPr>
+      <p:grpSpPr>
+        <a:xfrm>
+          <a:off x="0" y="0"/>
+          <a:ext cx="0" cy="0"/>
+          <a:chOff x="0" y="0"/>
+          <a:chExt cx="0" cy="0"/>
+        </a:xfrm>
+      </p:grpSpPr>
+      <p:sp>
+        <p:nvSpPr>
+          <p:cNvPr id="3" name="Объект 2">
+            <a:extLst>
+              <a:ext uri="{FF2B5EF4-FFF2-40B4-BE49-F238E27FC236}">
+                <a16:creationId xmlns:a16="http://schemas.microsoft.com/office/drawing/2014/main" id="{605A34B0-48B2-4F2E-B448-B6FAD6840879}"/>
+              </a:ext>
+            </a:extLst>
+          </p:cNvPr>
+          <p:cNvSpPr>
+            <a:spLocks noGrp="1"/>
+          </p:cNvSpPr>
+          <p:nvPr>
+            <p:ph sz="quarter" idx="13"/>
+          </p:nvPr>
+        </p:nvSpPr>
+        <p:spPr>
+          <a:xfrm>
+            <a:off x="0" y="1026543"/>
+            <a:ext cx="9005976" cy="5831457"/>
+          </a:xfrm>
+        </p:spPr>
+        <p:txBody>
+          <a:bodyPr>
+            <a:normAutofit fontScale="85000" lnSpcReduction="20000"/>
+          </a:bodyPr>
+          <a:lstStyle/>
+          <a:p>
+            <a:pPr algn="just"/>
+            <a:r>
+              <a:rPr lang="ru-RU" dirty="0"/>
+              <a:t>Объектом исследования являются экстремальные задачи маршрутизации перемещений с ограничениями различных типов; среди последних особо выделяем условия предшествования и динамические ограничения, возникающие по мере развития процесса и проведения тех или иных работ. При соответствующей формализации возникает постановка, идейно близкая к дискретным задачам управления (имеется в виду дискретность и по времени, и по фазовому состоянию). Оптимизируется комплекс, включающий точку старта, вариант очередности исполнения заданий (далее – маршрут) и конкретную траекторию; сам возникающий при этом комплекс (триплет) именуем маршрутным процессом. Возможные применения могут быть, в частности, связаны с атомной энергетикой (имеется в виду  задача минимизации дозовой нагрузки работников при демонтаже системы </a:t>
+            </a:r>
+            <a:r>
+              <a:rPr lang="ru-RU" dirty="0" err="1"/>
+              <a:t>радиационно</a:t>
+            </a:r>
+            <a:r>
+              <a:rPr lang="ru-RU" dirty="0"/>
+              <a:t> опасных объектов) и машиностроением; имеются и другие приложения. В настоящей работе мы ориентируемся на применение разрабатываемых методов в машиностроении.</a:t>
+            </a:r>
+          </a:p>
+          <a:p>
+            <a:pPr algn="just"/>
+            <a:r>
+              <a:rPr lang="ru-RU" dirty="0"/>
+              <a:t>Первоначальная задача управления режущим инструментом с условиями предшествования и динамическими ограничениями преобразуется к математической постановке оптимизационной задачи в классе вышеупомянутых маршрутных процессов; нашей целью является нахождение глобального экстремума и соответствующего оптимального решения. Обсуждаются элементы общей теории и конструируемый на основе этой теории оптимальный алгоритм, реализованный на многоядерной ПЭВМ.</a:t>
+            </a:r>
+          </a:p>
+        </p:txBody>
+      </p:sp>
+      <p:sp>
+        <p:nvSpPr>
+          <p:cNvPr id="4" name="TextBox 3">
+            <a:extLst>
+              <a:ext uri="{FF2B5EF4-FFF2-40B4-BE49-F238E27FC236}">
+                <a16:creationId xmlns:a16="http://schemas.microsoft.com/office/drawing/2014/main" id="{79F4B226-E2AE-4754-826F-2805087A611D}"/>
+              </a:ext>
+            </a:extLst>
+          </p:cNvPr>
+          <p:cNvSpPr txBox="1"/>
+          <p:nvPr/>
+        </p:nvSpPr>
+        <p:spPr>
+          <a:xfrm>
+            <a:off x="5868144" y="219759"/>
+            <a:ext cx="3024336" cy="646331"/>
+          </a:xfrm>
+          <a:prstGeom prst="rect">
+            <a:avLst/>
+          </a:prstGeom>
+          <a:noFill/>
+        </p:spPr>
+        <p:txBody>
+          <a:bodyPr wrap="square" rtlCol="0">
+            <a:spAutoFit/>
+            <a:scene3d>
+              <a:camera prst="orthographicFront"/>
+              <a:lightRig rig="soft" dir="tl">
+                <a:rot lat="0" lon="0" rev="0"/>
+              </a:lightRig>
+            </a:scene3d>
+            <a:sp3d contourW="25400" prstMaterial="matte">
+              <a:bevelT w="25400" h="55880" prst="artDeco"/>
+              <a:contourClr>
+                <a:schemeClr val="accent2">
+                  <a:tint val="20000"/>
+                </a:schemeClr>
+              </a:contourClr>
+            </a:sp3d>
+          </a:bodyPr>
+          <a:lstStyle/>
+          <a:p>
+            <a:pPr algn="r"/>
+            <a:r>
+              <a:rPr lang="ru-RU" sz="3600" b="1" spc="50" dirty="0">
+                <a:ln w="11430"/>
+                <a:gradFill>
+                  <a:gsLst>
+                    <a:gs pos="25000">
+                      <a:schemeClr val="accent2">
+                        <a:satMod val="155000"/>
+                      </a:schemeClr>
+                    </a:gs>
+                    <a:gs pos="100000">
+                      <a:schemeClr val="accent2">
+                        <a:shade val="45000"/>
+                        <a:satMod val="165000"/>
+                      </a:schemeClr>
+                    </a:gs>
+                  </a:gsLst>
+                  <a:lin ang="5400000"/>
+                </a:gradFill>
+                <a:effectLst>
+                  <a:outerShdw blurRad="76200" dist="50800" dir="5400000" algn="tl" rotWithShape="0">
+                    <a:srgbClr val="000000">
+                      <a:alpha val="65000"/>
+                    </a:srgbClr>
+                  </a:outerShdw>
+                </a:effectLst>
+              </a:rPr>
+              <a:t>Введение</a:t>
+            </a:r>
+          </a:p>
+        </p:txBody>
+      </p:sp>
+    </p:spTree>
+    <p:extLst>
+      <p:ext uri="{BB962C8B-B14F-4D97-AF65-F5344CB8AC3E}">
+        <p14:creationId xmlns:p14="http://schemas.microsoft.com/office/powerpoint/2010/main" val="255341494"/>
+      </p:ext>
+    </p:extLst>
+  </p:cSld>
+  <p:clrMapOvr>
+    <a:masterClrMapping/>
+  </p:clrMapOvr>
+</p:sld>
+</file>
+
+<file path=ppt/slides/slide3.xml><?xml version="1.0" encoding="utf-8"?>
+<p:sld xmlns:a="http://schemas.openxmlformats.org/drawingml/2006/main" xmlns:r="http://schemas.openxmlformats.org/officeDocument/2006/relationships" xmlns:p="http://schemas.openxmlformats.org/presentationml/2006/main">
+  <p:cSld>
+    <p:spTree>
+      <p:nvGrpSpPr>
+        <p:cNvPr id="1" name=""/>
+        <p:cNvGrpSpPr/>
+        <p:nvPr/>
+      </p:nvGrpSpPr>
+      <p:grpSpPr>
+        <a:xfrm>
+          <a:off x="0" y="0"/>
+          <a:ext cx="0" cy="0"/>
+          <a:chOff x="0" y="0"/>
+          <a:chExt cx="0" cy="0"/>
+        </a:xfrm>
+      </p:grpSpPr>
+      <mc:AlternateContent xmlns:mc="http://schemas.openxmlformats.org/markup-compatibility/2006">
+        <mc:Choice xmlns:a14="http://schemas.microsoft.com/office/drawing/2010/main" Requires="a14">
+          <p:sp>
+            <p:nvSpPr>
+              <p:cNvPr id="3" name="Объект 2">
+                <a:extLst>
+                  <a:ext uri="{FF2B5EF4-FFF2-40B4-BE49-F238E27FC236}">
+                    <a16:creationId xmlns:a16="http://schemas.microsoft.com/office/drawing/2014/main" id="{3CECA012-B7C9-4F76-B9D3-C54ACA5207D5}"/>
+                  </a:ext>
+                </a:extLst>
+              </p:cNvPr>
+              <p:cNvSpPr>
+                <a:spLocks noGrp="1"/>
+              </p:cNvSpPr>
+              <p:nvPr>
+                <p:ph sz="quarter" idx="13"/>
+              </p:nvPr>
+            </p:nvSpPr>
+            <p:spPr>
+              <a:xfrm>
+                <a:off x="0" y="2354025"/>
+                <a:ext cx="8892480" cy="4936934"/>
+              </a:xfrm>
+            </p:spPr>
+            <p:txBody>
+              <a:bodyPr>
+                <a:normAutofit fontScale="70000" lnSpcReduction="20000"/>
+              </a:bodyPr>
+              <a:lstStyle/>
+              <a:p>
+                <a:pPr algn="just"/>
+                <a:r>
+                  <a:rPr lang="ru-RU" dirty="0"/>
+                  <a:t>Задан прямоугольник на плоскости </a:t>
+                </a:r>
+                <a14:m>
+                  <m:oMath xmlns:m="http://schemas.openxmlformats.org/officeDocument/2006/math">
+                    <m:r>
+                      <a:rPr lang="ru-RU" i="1"/>
+                      <m:t>𝑋</m:t>
+                    </m:r>
+                    <m:r>
+                      <a:rPr lang="ru-RU" i="1"/>
+                      <m:t>=[0,</m:t>
+                    </m:r>
+                    <m:r>
+                      <a:rPr lang="ru-RU" i="1"/>
+                      <m:t>𝑎</m:t>
+                    </m:r>
+                    <m:r>
+                      <a:rPr lang="ru-RU" i="1"/>
+                      <m:t>]×[0,</m:t>
+                    </m:r>
+                    <m:r>
+                      <a:rPr lang="ru-RU" i="1"/>
+                      <m:t>𝑏</m:t>
+                    </m:r>
+                    <m:r>
+                      <a:rPr lang="ru-RU" i="1"/>
+                      <m:t>]</m:t>
+                    </m:r>
+                  </m:oMath>
+                </a14:m>
+                <a:r>
+                  <a:rPr lang="ru-RU" dirty="0"/>
+                  <a:t>, где </a:t>
+                </a:r>
+                <a14:m>
+                  <m:oMath xmlns:m="http://schemas.openxmlformats.org/officeDocument/2006/math">
+                    <m:r>
+                      <a:rPr lang="ru-RU" i="1"/>
+                      <m:t>𝑎</m:t>
+                    </m:r>
+                    <m:r>
+                      <a:rPr lang="ru-RU" i="1"/>
+                      <m:t>&gt;0,</m:t>
+                    </m:r>
+                    <m:r>
+                      <a:rPr lang="ru-RU" i="1"/>
+                      <m:t>𝑏</m:t>
+                    </m:r>
+                    <m:r>
+                      <a:rPr lang="ru-RU" i="1"/>
+                      <m:t>&gt;0</m:t>
+                    </m:r>
+                  </m:oMath>
+                </a14:m>
+                <a:r>
+                  <a:rPr lang="ru-RU" dirty="0"/>
+                  <a:t>. Имеется раскройный план; намечены контуры попарно дизъюнктных деталей. У каждой детали имеется внешний контур и, возможно, несколько внутренних контуров. Реально контуры окружены близкими к ним эквидистантами. Однако сейчас для простоты полагаем их совпадающими с контурами, то есть будем говорить о резке по контурам. По технологическим соображениям резка внутренних контуров каждой детали (если они есть) должна предшествовать резке внешнего контура. Возникает естественный вариант условий предшествования. В интересах компьютерной реализации считаем, что возле каждого контура намечены возможные точки врезки и соответствующие им точки выключения инструмента: итак, процедура врезки должным образом </a:t>
+                </a:r>
+                <a:r>
+                  <a:rPr lang="ru-RU" dirty="0" err="1"/>
+                  <a:t>дискретизируется</a:t>
+                </a:r>
+                <a:r>
+                  <a:rPr lang="ru-RU" dirty="0"/>
+                  <a:t>. В результате возникают непустые конечные множества – мегаполисы </a:t>
+                </a:r>
+                <a14:m>
+                  <m:oMath xmlns:m="http://schemas.openxmlformats.org/officeDocument/2006/math">
+                    <m:sSub>
+                      <m:sSubPr>
+                        <m:ctrlPr>
+                          <a:rPr lang="ru-RU" i="1"/>
+                        </m:ctrlPr>
+                      </m:sSubPr>
+                      <m:e>
+                        <m:r>
+                          <a:rPr lang="ru-RU" i="1"/>
+                          <m:t>𝑀</m:t>
+                        </m:r>
+                      </m:e>
+                      <m:sub>
+                        <m:r>
+                          <a:rPr lang="ru-RU" i="1"/>
+                          <m:t>1</m:t>
+                        </m:r>
+                      </m:sub>
+                    </m:sSub>
+                    <m:r>
+                      <a:rPr lang="ru-RU" i="1"/>
+                      <m:t>,…,</m:t>
+                    </m:r>
+                    <m:sSub>
+                      <m:sSubPr>
+                        <m:ctrlPr>
+                          <a:rPr lang="ru-RU" i="1"/>
+                        </m:ctrlPr>
+                      </m:sSubPr>
+                      <m:e>
+                        <m:r>
+                          <a:rPr lang="ru-RU" i="1"/>
+                          <m:t>𝑀</m:t>
+                        </m:r>
+                      </m:e>
+                      <m:sub>
+                        <m:r>
+                          <a:rPr lang="ru-RU" i="1"/>
+                          <m:t>𝑁</m:t>
+                        </m:r>
+                      </m:sub>
+                    </m:sSub>
+                  </m:oMath>
+                </a14:m>
+                <a:r>
+                  <a:rPr lang="ru-RU" dirty="0"/>
+                  <a:t>, где </a:t>
+                </a:r>
+                <a14:m>
+                  <m:oMath xmlns:m="http://schemas.openxmlformats.org/officeDocument/2006/math">
+                    <m:r>
+                      <a:rPr lang="ru-RU" i="1"/>
+                      <m:t>𝑁</m:t>
+                    </m:r>
+                  </m:oMath>
+                </a14:m>
+                <a:r>
+                  <a:rPr lang="ru-RU" dirty="0"/>
+                  <a:t> – натуральное число, для которого </a:t>
+                </a:r>
+                <a14:m>
+                  <m:oMath xmlns:m="http://schemas.openxmlformats.org/officeDocument/2006/math">
+                    <m:r>
+                      <a:rPr lang="ru-RU" i="1"/>
+                      <m:t>𝑁</m:t>
+                    </m:r>
+                    <m:r>
+                      <a:rPr lang="ru-RU" i="1"/>
+                      <m:t>⩾2</m:t>
+                    </m:r>
+                  </m:oMath>
+                </a14:m>
+                <a:r>
+                  <a:rPr lang="ru-RU" dirty="0"/>
+                  <a:t>. Элементами этих множеств являются точки врезки и точки выключения инструмента. Точки этих двух типов группируются в пары. Для каждого мегаполиса </a:t>
+                </a:r>
+                <a14:m>
+                  <m:oMath xmlns:m="http://schemas.openxmlformats.org/officeDocument/2006/math">
+                    <m:sSub>
+                      <m:sSubPr>
+                        <m:ctrlPr>
+                          <a:rPr lang="ru-RU" i="1"/>
+                        </m:ctrlPr>
+                      </m:sSubPr>
+                      <m:e>
+                        <m:r>
+                          <a:rPr lang="ru-RU" i="1"/>
+                          <m:t>𝑀</m:t>
+                        </m:r>
+                      </m:e>
+                      <m:sub>
+                        <m:r>
+                          <a:rPr lang="ru-RU" i="1"/>
+                          <m:t>𝑗</m:t>
+                        </m:r>
+                      </m:sub>
+                    </m:sSub>
+                  </m:oMath>
+                </a14:m>
+                <a:r>
+                  <a:rPr lang="ru-RU" dirty="0"/>
+                  <a:t> определено отношение в виде подмножества </a:t>
+                </a:r>
+                <a14:m>
+                  <m:oMath xmlns:m="http://schemas.openxmlformats.org/officeDocument/2006/math">
+                    <m:sSub>
+                      <m:sSubPr>
+                        <m:ctrlPr>
+                          <a:rPr lang="ru-RU" i="1"/>
+                        </m:ctrlPr>
+                      </m:sSubPr>
+                      <m:e>
+                        <m:r>
+                          <a:rPr lang="ru-RU" i="1"/>
+                          <m:t>𝑀</m:t>
+                        </m:r>
+                      </m:e>
+                      <m:sub>
+                        <m:r>
+                          <a:rPr lang="ru-RU" i="1"/>
+                          <m:t>𝑗</m:t>
+                        </m:r>
+                      </m:sub>
+                    </m:sSub>
+                    <m:r>
+                      <a:rPr lang="ru-RU" i="1"/>
+                      <m:t>×</m:t>
+                    </m:r>
+                    <m:sSub>
+                      <m:sSubPr>
+                        <m:ctrlPr>
+                          <a:rPr lang="ru-RU" i="1"/>
+                        </m:ctrlPr>
+                      </m:sSubPr>
+                      <m:e>
+                        <m:r>
+                          <a:rPr lang="ru-RU" i="1"/>
+                          <m:t>𝑀</m:t>
+                        </m:r>
+                      </m:e>
+                      <m:sub>
+                        <m:r>
+                          <a:rPr lang="ru-RU" i="1"/>
+                          <m:t>𝑗</m:t>
+                        </m:r>
+                      </m:sub>
+                    </m:sSub>
+                  </m:oMath>
+                </a14:m>
+                <a:r>
+                  <a:rPr lang="ru-RU" dirty="0"/>
+                  <a:t>; оно всякий раз состоит из упорядоченных пар. Элементами каждой такой пары являются точка врезки и соответствующая ей точка выключения инструмента. Предполагается, что инструмент, покидая точку старта, перемещается к мегаполису </a:t>
+                </a:r>
+                <a14:m>
+                  <m:oMath xmlns:m="http://schemas.openxmlformats.org/officeDocument/2006/math">
+                    <m:sSub>
+                      <m:sSubPr>
+                        <m:ctrlPr>
+                          <a:rPr lang="ru-RU" i="1"/>
+                        </m:ctrlPr>
+                      </m:sSubPr>
+                      <m:e>
+                        <m:r>
+                          <a:rPr lang="ru-RU" i="1"/>
+                          <m:t>𝑀</m:t>
+                        </m:r>
+                      </m:e>
+                      <m:sub>
+                        <m:r>
+                          <a:rPr lang="ru-RU" i="1"/>
+                          <m:t>𝑗</m:t>
+                        </m:r>
+                      </m:sub>
+                    </m:sSub>
+                  </m:oMath>
+                </a14:m>
+                <a:r>
+                  <a:rPr lang="ru-RU" dirty="0"/>
+                  <a:t>, занумерованному первым, прибывает к некоторой (из намеченных заранее) точке врезки </a:t>
+                </a:r>
+                <a:r>
+                  <a:rPr lang="en-US" dirty="0"/>
+                  <a:t>x</a:t>
+                </a:r>
+                <a:r>
+                  <a:rPr lang="ru-RU" dirty="0"/>
+                  <a:t>, после чего выполняется врезка и работа по вырезанию контура с последующим перемещением в точку выключения инструмента </a:t>
+                </a:r>
+                <a14:m>
+                  <m:oMath xmlns:m="http://schemas.openxmlformats.org/officeDocument/2006/math">
+                    <m:r>
+                      <a:rPr lang="ru-RU" i="1"/>
+                      <m:t>𝑦</m:t>
+                    </m:r>
+                  </m:oMath>
+                </a14:m>
+                <a:r>
+                  <a:rPr lang="ru-RU" dirty="0"/>
+                  <a:t>; затем  инструмент перемещается к мегаполису, занумерованному вторым и т.д.; при этом </a:t>
+                </a:r>
+                <a14:m>
+                  <m:oMath xmlns:m="http://schemas.openxmlformats.org/officeDocument/2006/math">
+                    <m:r>
+                      <a:rPr lang="ru-RU" i="1"/>
+                      <m:t>𝑧</m:t>
+                    </m:r>
+                    <m:r>
+                      <a:rPr lang="ru-RU" i="1"/>
+                      <m:t>=(</m:t>
+                    </m:r>
+                    <m:r>
+                      <a:rPr lang="ru-RU" i="1"/>
+                      <m:t>𝑥</m:t>
+                    </m:r>
+                    <m:r>
+                      <a:rPr lang="ru-RU" i="1"/>
+                      <m:t>,</m:t>
+                    </m:r>
+                    <m:r>
+                      <a:rPr lang="ru-RU" i="1"/>
+                      <m:t>𝑦</m:t>
+                    </m:r>
+                    <m:r>
+                      <a:rPr lang="ru-RU" i="1"/>
+                      <m:t>)∈</m:t>
+                    </m:r>
+                    <m:sSub>
+                      <m:sSubPr>
+                        <m:ctrlPr>
+                          <a:rPr lang="ru-RU" i="1"/>
+                        </m:ctrlPr>
+                      </m:sSubPr>
+                      <m:e>
+                        <m:r>
+                          <a:rPr lang="ru-RU" i="1"/>
+                          <m:t>𝕄</m:t>
+                        </m:r>
+                      </m:e>
+                      <m:sub>
+                        <m:r>
+                          <a:rPr lang="ru-RU" i="1"/>
+                          <m:t>𝑗</m:t>
+                        </m:r>
+                      </m:sub>
+                    </m:sSub>
+                  </m:oMath>
+                </a14:m>
+                <a:r>
+                  <a:rPr lang="ru-RU" dirty="0"/>
+                  <a:t>.  С учетом последнего замечания можно принять, что развитие маршрутного процесса характеризуется схемой </a:t>
+                </a:r>
+                <a14:m>
+                  <m:oMath xmlns:m="http://schemas.openxmlformats.org/officeDocument/2006/math">
+                    <m:sSub>
+                      <m:sSubPr>
+                        <m:ctrlPr>
+                          <a:rPr lang="ru-RU" i="1"/>
+                        </m:ctrlPr>
+                      </m:sSubPr>
+                      <m:e>
+                        <m:r>
+                          <a:rPr lang="ru-RU" i="1"/>
+                          <m:t>𝑥</m:t>
+                        </m:r>
+                      </m:e>
+                      <m:sub>
+                        <m:r>
+                          <a:rPr lang="ru-RU" i="1"/>
+                          <m:t>0</m:t>
+                        </m:r>
+                      </m:sub>
+                    </m:sSub>
+                    <m:r>
+                      <a:rPr lang="ru-RU" i="1"/>
+                      <m:t>→</m:t>
+                    </m:r>
+                    <m:sSub>
+                      <m:sSubPr>
+                        <m:ctrlPr>
+                          <a:rPr lang="ru-RU" i="1"/>
+                        </m:ctrlPr>
+                      </m:sSubPr>
+                      <m:e>
+                        <m:r>
+                          <a:rPr lang="ru-RU" i="1"/>
+                          <m:t>𝑧</m:t>
+                        </m:r>
+                      </m:e>
+                      <m:sub>
+                        <m:r>
+                          <a:rPr lang="ru-RU" i="1"/>
+                          <m:t>1</m:t>
+                        </m:r>
+                      </m:sub>
+                    </m:sSub>
+                    <m:r>
+                      <a:rPr lang="ru-RU" i="1"/>
+                      <m:t>∈</m:t>
+                    </m:r>
+                    <m:sSub>
+                      <m:sSubPr>
+                        <m:ctrlPr>
+                          <a:rPr lang="ru-RU" i="1"/>
+                        </m:ctrlPr>
+                      </m:sSubPr>
+                      <m:e>
+                        <m:r>
+                          <a:rPr lang="ru-RU" i="1"/>
+                          <m:t>𝕄</m:t>
+                        </m:r>
+                      </m:e>
+                      <m:sub>
+                        <m:r>
+                          <a:rPr lang="ru-RU" i="1"/>
+                          <m:t>𝛼</m:t>
+                        </m:r>
+                        <m:r>
+                          <a:rPr lang="ru-RU" i="1"/>
+                          <m:t>(1)</m:t>
+                        </m:r>
+                      </m:sub>
+                    </m:sSub>
+                    <m:r>
+                      <a:rPr lang="ru-RU" i="1"/>
+                      <m:t>→⋯→</m:t>
+                    </m:r>
+                    <m:sSub>
+                      <m:sSubPr>
+                        <m:ctrlPr>
+                          <a:rPr lang="ru-RU" i="1"/>
+                        </m:ctrlPr>
+                      </m:sSubPr>
+                      <m:e>
+                        <m:r>
+                          <a:rPr lang="ru-RU" i="1"/>
+                          <m:t>𝑧</m:t>
+                        </m:r>
+                      </m:e>
+                      <m:sub>
+                        <m:r>
+                          <a:rPr lang="ru-RU" i="1"/>
+                          <m:t>𝑁</m:t>
+                        </m:r>
+                      </m:sub>
+                    </m:sSub>
+                    <m:r>
+                      <a:rPr lang="ru-RU" i="1"/>
+                      <m:t>∈</m:t>
+                    </m:r>
+                    <m:sSub>
+                      <m:sSubPr>
+                        <m:ctrlPr>
+                          <a:rPr lang="ru-RU" i="1"/>
+                        </m:ctrlPr>
+                      </m:sSubPr>
+                      <m:e>
+                        <m:r>
+                          <a:rPr lang="ru-RU" i="1"/>
+                          <m:t>𝕄</m:t>
+                        </m:r>
+                      </m:e>
+                      <m:sub>
+                        <m:r>
+                          <a:rPr lang="ru-RU" i="1"/>
+                          <m:t>𝛼</m:t>
+                        </m:r>
+                        <m:r>
+                          <a:rPr lang="ru-RU" i="1"/>
+                          <m:t>(</m:t>
+                        </m:r>
+                        <m:r>
+                          <a:rPr lang="ru-RU" i="1"/>
+                          <m:t>𝑁</m:t>
+                        </m:r>
+                        <m:r>
+                          <a:rPr lang="ru-RU" i="1"/>
+                          <m:t>)</m:t>
+                        </m:r>
+                      </m:sub>
+                    </m:sSub>
+                  </m:oMath>
+                </a14:m>
+                <a:r>
+                  <a:rPr lang="ru-RU" dirty="0"/>
+                  <a:t>, где </a:t>
+                </a:r>
+                <a14:m>
+                  <m:oMath xmlns:m="http://schemas.openxmlformats.org/officeDocument/2006/math">
+                    <m:r>
+                      <a:rPr lang="ru-RU" i="1"/>
+                      <m:t>𝑁</m:t>
+                    </m:r>
+                  </m:oMath>
+                </a14:m>
+                <a:r>
+                  <a:rPr lang="ru-RU" dirty="0"/>
+                  <a:t> есть количество контуров, </a:t>
+                </a:r>
+                <a14:m>
+                  <m:oMath xmlns:m="http://schemas.openxmlformats.org/officeDocument/2006/math">
+                    <m:sSub>
+                      <m:sSubPr>
+                        <m:ctrlPr>
+                          <a:rPr lang="ru-RU" i="1"/>
+                        </m:ctrlPr>
+                      </m:sSubPr>
+                      <m:e>
+                        <m:r>
+                          <a:rPr lang="ru-RU" i="1"/>
+                          <m:t>𝑥</m:t>
+                        </m:r>
+                      </m:e>
+                      <m:sub>
+                        <m:r>
+                          <a:rPr lang="ru-RU" i="1"/>
+                          <m:t>0</m:t>
+                        </m:r>
+                      </m:sub>
+                    </m:sSub>
+                  </m:oMath>
+                </a14:m>
+                <a:r>
+                  <a:rPr lang="ru-RU" dirty="0"/>
+                  <a:t> – точка старта, </a:t>
+                </a:r>
+                <a14:m>
+                  <m:oMath xmlns:m="http://schemas.openxmlformats.org/officeDocument/2006/math">
+                    <m:r>
+                      <a:rPr lang="ru-RU" i="1"/>
+                      <m:t>𝛼</m:t>
+                    </m:r>
+                    <m:r>
+                      <a:rPr lang="ru-RU" i="1"/>
+                      <m:t>=(</m:t>
+                    </m:r>
+                    <m:r>
+                      <a:rPr lang="ru-RU" i="1"/>
+                      <m:t>𝛼</m:t>
+                    </m:r>
+                    <m:r>
+                      <a:rPr lang="ru-RU" i="1"/>
+                      <m:t>(1),…,</m:t>
+                    </m:r>
+                    <m:r>
+                      <a:rPr lang="ru-RU" i="1"/>
+                      <m:t>𝛼</m:t>
+                    </m:r>
+                    <m:r>
+                      <a:rPr lang="ru-RU" i="1"/>
+                      <m:t>(</m:t>
+                    </m:r>
+                    <m:r>
+                      <a:rPr lang="ru-RU" i="1"/>
+                      <m:t>𝑁</m:t>
+                    </m:r>
+                    <m:r>
+                      <a:rPr lang="ru-RU" i="1"/>
+                      <m:t>))</m:t>
+                    </m:r>
+                  </m:oMath>
+                </a14:m>
+                <a:r>
+                  <a:rPr lang="ru-RU" dirty="0"/>
+                  <a:t> – перестановка индексов. </a:t>
+                </a:r>
+              </a:p>
+            </p:txBody>
+          </p:sp>
+        </mc:Choice>
+        <mc:Fallback>
+          <p:sp>
+            <p:nvSpPr>
+              <p:cNvPr id="3" name="Объект 2">
+                <a:extLst>
+                  <a:ext uri="{FF2B5EF4-FFF2-40B4-BE49-F238E27FC236}">
+                    <a16:creationId xmlns:a16="http://schemas.microsoft.com/office/drawing/2014/main" id="{3CECA012-B7C9-4F76-B9D3-C54ACA5207D5}"/>
+                  </a:ext>
+                </a:extLst>
+              </p:cNvPr>
+              <p:cNvSpPr>
+                <a:spLocks noGrp="1" noRot="1" noChangeAspect="1" noMove="1" noResize="1" noEditPoints="1" noAdjustHandles="1" noChangeArrowheads="1" noChangeShapeType="1" noTextEdit="1"/>
+              </p:cNvSpPr>
+              <p:nvPr>
+                <p:ph sz="quarter" idx="13"/>
+              </p:nvPr>
+            </p:nvSpPr>
+            <p:spPr>
+              <a:xfrm>
+                <a:off x="0" y="2354025"/>
+                <a:ext cx="8892480" cy="4936934"/>
+              </a:xfrm>
+              <a:blipFill>
+                <a:blip r:embed="rId2"/>
+                <a:stretch>
+                  <a:fillRect l="-69" t="-2469" r="-274"/>
+                </a:stretch>
+              </a:blipFill>
+            </p:spPr>
+            <p:txBody>
+              <a:bodyPr/>
+              <a:lstStyle/>
+              <a:p>
+                <a:r>
+                  <a:rPr lang="ru-RU">
+                    <a:noFill/>
+                  </a:rPr>
+                  <a:t> </a:t>
+                </a:r>
+              </a:p>
+            </p:txBody>
+          </p:sp>
+        </mc:Fallback>
+      </mc:AlternateContent>
+      <p:sp>
+        <p:nvSpPr>
+          <p:cNvPr id="4" name="TextBox 3">
+            <a:extLst>
+              <a:ext uri="{FF2B5EF4-FFF2-40B4-BE49-F238E27FC236}">
+                <a16:creationId xmlns:a16="http://schemas.microsoft.com/office/drawing/2014/main" id="{36FA02DA-DE39-4FB1-B6EA-89ED7C607315}"/>
+              </a:ext>
+            </a:extLst>
+          </p:cNvPr>
+          <p:cNvSpPr txBox="1"/>
+          <p:nvPr/>
+        </p:nvSpPr>
+        <p:spPr>
+          <a:xfrm>
+            <a:off x="3821502" y="219759"/>
+            <a:ext cx="5070978" cy="646331"/>
+          </a:xfrm>
+          <a:prstGeom prst="rect">
+            <a:avLst/>
+          </a:prstGeom>
+          <a:noFill/>
+        </p:spPr>
+        <p:txBody>
+          <a:bodyPr wrap="square" rtlCol="0">
+            <a:spAutoFit/>
+            <a:scene3d>
+              <a:camera prst="orthographicFront"/>
+              <a:lightRig rig="soft" dir="tl">
+                <a:rot lat="0" lon="0" rev="0"/>
+              </a:lightRig>
+            </a:scene3d>
+            <a:sp3d contourW="25400" prstMaterial="matte">
+              <a:bevelT w="25400" h="55880" prst="artDeco"/>
+              <a:contourClr>
+                <a:schemeClr val="accent2">
+                  <a:tint val="20000"/>
+                </a:schemeClr>
+              </a:contourClr>
+            </a:sp3d>
+          </a:bodyPr>
+          <a:lstStyle/>
+          <a:p>
+            <a:pPr algn="r"/>
+            <a:r>
+              <a:rPr lang="ru-RU" sz="3600" b="1" spc="50" dirty="0">
+                <a:ln w="11430"/>
+                <a:gradFill>
+                  <a:gsLst>
+                    <a:gs pos="25000">
+                      <a:schemeClr val="accent2">
+                        <a:satMod val="155000"/>
+                      </a:schemeClr>
+                    </a:gs>
+                    <a:gs pos="100000">
+                      <a:schemeClr val="accent2">
+                        <a:shade val="45000"/>
+                        <a:satMod val="165000"/>
+                      </a:schemeClr>
+                    </a:gs>
+                  </a:gsLst>
+                  <a:lin ang="5400000"/>
+                </a:gradFill>
+                <a:effectLst>
+                  <a:outerShdw blurRad="76200" dist="50800" dir="5400000" algn="tl" rotWithShape="0">
+                    <a:srgbClr val="000000">
+                      <a:alpha val="65000"/>
+                    </a:srgbClr>
+                  </a:outerShdw>
+                </a:effectLst>
+              </a:rPr>
+              <a:t>Постановка задачи</a:t>
+            </a:r>
+          </a:p>
+        </p:txBody>
+      </p:sp>
+      <p:pic>
+        <p:nvPicPr>
+          <p:cNvPr id="5" name="Рисунок 4" descr="E:\My\Work\Asp\Latex\HomeWork\MiM2019\media\3211-gtsp.png">
+            <a:extLst>
+              <a:ext uri="{FF2B5EF4-FFF2-40B4-BE49-F238E27FC236}">
+                <a16:creationId xmlns:a16="http://schemas.microsoft.com/office/drawing/2014/main" id="{E3D66CC2-1E18-4C1F-8872-ED003E7F5362}"/>
+              </a:ext>
+            </a:extLst>
+          </p:cNvPr>
+          <p:cNvPicPr/>
+          <p:nvPr/>
+        </p:nvPicPr>
+        <p:blipFill>
+          <a:blip r:embed="rId3" cstate="print">
+            <a:extLst>
+              <a:ext uri="{28A0092B-C50C-407E-A947-70E740481C1C}">
+                <a14:useLocalDpi xmlns:a14="http://schemas.microsoft.com/office/drawing/2010/main" val="0"/>
+              </a:ext>
+            </a:extLst>
+          </a:blip>
+          <a:srcRect/>
+          <a:stretch>
+            <a:fillRect/>
+          </a:stretch>
+        </p:blipFill>
+        <p:spPr bwMode="auto">
+          <a:xfrm>
+            <a:off x="116053" y="132312"/>
+            <a:ext cx="4241779" cy="2134265"/>
+          </a:xfrm>
+          <a:prstGeom prst="rect">
+            <a:avLst/>
+          </a:prstGeom>
+          <a:noFill/>
+          <a:ln>
+            <a:noFill/>
+          </a:ln>
+        </p:spPr>
+      </p:pic>
+    </p:spTree>
+    <p:extLst>
+      <p:ext uri="{BB962C8B-B14F-4D97-AF65-F5344CB8AC3E}">
+        <p14:creationId xmlns:p14="http://schemas.microsoft.com/office/powerpoint/2010/main" val="3162075575"/>
+      </p:ext>
+    </p:extLst>
+  </p:cSld>
+  <p:clrMapOvr>
+    <a:masterClrMapping/>
+  </p:clrMapOvr>
+</p:sld>
+</file>
+
+<file path=ppt/slides/slide4.xml><?xml version="1.0" encoding="utf-8"?>
+<p:sld xmlns:a="http://schemas.openxmlformats.org/drawingml/2006/main" xmlns:r="http://schemas.openxmlformats.org/officeDocument/2006/relationships" xmlns:p="http://schemas.openxmlformats.org/presentationml/2006/main">
+  <p:cSld>
+    <p:spTree>
+      <p:nvGrpSpPr>
+        <p:cNvPr id="1" name=""/>
+        <p:cNvGrpSpPr/>
+        <p:nvPr/>
+      </p:nvGrpSpPr>
+      <p:grpSpPr>
+        <a:xfrm>
+          <a:off x="0" y="0"/>
+          <a:ext cx="0" cy="0"/>
+          <a:chOff x="0" y="0"/>
+          <a:chExt cx="0" cy="0"/>
+        </a:xfrm>
+      </p:grpSpPr>
+      <p:sp>
+        <p:nvSpPr>
+          <p:cNvPr id="3" name="Объект 2">
+            <a:extLst>
+              <a:ext uri="{FF2B5EF4-FFF2-40B4-BE49-F238E27FC236}">
+                <a16:creationId xmlns:a16="http://schemas.microsoft.com/office/drawing/2014/main" id="{A4FD6006-3F1B-4FED-8BDF-B8A24C9551AE}"/>
+              </a:ext>
+            </a:extLst>
+          </p:cNvPr>
+          <p:cNvSpPr>
+            <a:spLocks noGrp="1"/>
+          </p:cNvSpPr>
+          <p:nvPr>
+            <p:ph sz="quarter" idx="13"/>
+          </p:nvPr>
+        </p:nvSpPr>
+        <p:spPr>
+          <a:xfrm>
+            <a:off x="352778" y="1194364"/>
+            <a:ext cx="8539702" cy="5533813"/>
+          </a:xfrm>
+        </p:spPr>
+        <p:txBody>
+          <a:bodyPr>
+            <a:normAutofit fontScale="77500" lnSpcReduction="20000"/>
+          </a:bodyPr>
+          <a:lstStyle/>
+          <a:p>
+            <a:pPr algn="just"/>
+            <a:r>
+              <a:rPr lang="ru-RU" dirty="0"/>
+              <a:t>Имеются условия предшествования: резка внутренних контуров детали должна предшествовать резке внешнего контура. Возможны и другие варианты упомянутых условий предшествования; например, может использоваться правило: сначала режутся «большие» детали. Из других ограничений сейчас отметим условия, имеющие смысл тепловых допусков. Имеется в виду обеспечение ситуации, при которой возле точек врезки сохранялось бы достаточно большая (в смысле площади) область </a:t>
+            </a:r>
+            <a:r>
+              <a:rPr lang="ru-RU" dirty="0" err="1"/>
+              <a:t>невырезанного</a:t>
+            </a:r>
+            <a:r>
+              <a:rPr lang="ru-RU" dirty="0"/>
+              <a:t> металла с тем, чтобы обеспечивался удовлетворительный отвод тепла (имеется в виду случай термической резки). </a:t>
+            </a:r>
+          </a:p>
+          <a:p>
+            <a:pPr algn="just"/>
+            <a:r>
+              <a:rPr lang="ru-RU" dirty="0"/>
+              <a:t>В рассматриваемой модели резки по замкнутому контуру на этапе математической постановки исключено собственно время резки контуров, поскольку оно одинаково для всех вариантов решения и может быть легко учтено введением дополнительного слагаемого. Функция стоимости внешних перемещений определена как время, затрачиваемое в режиме холостого хода. Аналогично оценивается терминальное состояние: учитывается время перемещения до точки парковки в режиме холостого хода. Стоимость внутренних работ получается суммированием двух компонент. Одна из них определяется суммой времен, затрачиваемых на перемещение от точки врезки до точки начала реза, и от последней – до точки выключения инструмента (перемещение со скоростью рабочего хода). Вторая компонента определяется функцией штрафа и «включается» при нарушении тепловых допусков. Предполагается, что точка начала реза сопоставляется каждой паре с элементами в виде точки врезки и точки выключения инструмента. Таким образом, формируется значение суммарного времени для каждого маршрутного процесса.</a:t>
+            </a:r>
+          </a:p>
+          <a:p>
+            <a:endParaRPr lang="ru-RU" dirty="0"/>
+          </a:p>
+        </p:txBody>
+      </p:sp>
+      <p:sp>
+        <p:nvSpPr>
+          <p:cNvPr id="4" name="TextBox 3">
+            <a:extLst>
+              <a:ext uri="{FF2B5EF4-FFF2-40B4-BE49-F238E27FC236}">
+                <a16:creationId xmlns:a16="http://schemas.microsoft.com/office/drawing/2014/main" id="{437F32A8-525F-4097-9638-AC16BAAAAA8B}"/>
+              </a:ext>
+            </a:extLst>
+          </p:cNvPr>
+          <p:cNvSpPr txBox="1"/>
+          <p:nvPr/>
+        </p:nvSpPr>
+        <p:spPr>
+          <a:xfrm>
+            <a:off x="3821502" y="219759"/>
+            <a:ext cx="5070978" cy="646331"/>
+          </a:xfrm>
+          <a:prstGeom prst="rect">
+            <a:avLst/>
+          </a:prstGeom>
+          <a:noFill/>
+        </p:spPr>
+        <p:txBody>
+          <a:bodyPr wrap="square" rtlCol="0">
+            <a:spAutoFit/>
+            <a:scene3d>
+              <a:camera prst="orthographicFront"/>
+              <a:lightRig rig="soft" dir="tl">
+                <a:rot lat="0" lon="0" rev="0"/>
+              </a:lightRig>
+            </a:scene3d>
+            <a:sp3d contourW="25400" prstMaterial="matte">
+              <a:bevelT w="25400" h="55880" prst="artDeco"/>
+              <a:contourClr>
+                <a:schemeClr val="accent2">
+                  <a:tint val="20000"/>
+                </a:schemeClr>
+              </a:contourClr>
+            </a:sp3d>
+          </a:bodyPr>
+          <a:lstStyle/>
+          <a:p>
+            <a:pPr algn="r"/>
+            <a:r>
+              <a:rPr lang="ru-RU" sz="3600" b="1" spc="50" dirty="0">
+                <a:ln w="11430"/>
+                <a:gradFill>
+                  <a:gsLst>
+                    <a:gs pos="25000">
+                      <a:schemeClr val="accent2">
+                        <a:satMod val="155000"/>
+                      </a:schemeClr>
+                    </a:gs>
+                    <a:gs pos="100000">
+                      <a:schemeClr val="accent2">
+                        <a:shade val="45000"/>
+                        <a:satMod val="165000"/>
+                      </a:schemeClr>
+                    </a:gs>
+                  </a:gsLst>
+                  <a:lin ang="5400000"/>
+                </a:gradFill>
+                <a:effectLst>
+                  <a:outerShdw blurRad="76200" dist="50800" dir="5400000" algn="tl" rotWithShape="0">
+                    <a:srgbClr val="000000">
+                      <a:alpha val="65000"/>
+                    </a:srgbClr>
+                  </a:outerShdw>
+                </a:effectLst>
+              </a:rPr>
+              <a:t>Постановка задачи</a:t>
+            </a:r>
+          </a:p>
+        </p:txBody>
+      </p:sp>
+    </p:spTree>
+    <p:extLst>
+      <p:ext uri="{BB962C8B-B14F-4D97-AF65-F5344CB8AC3E}">
+        <p14:creationId xmlns:p14="http://schemas.microsoft.com/office/powerpoint/2010/main" val="448591529"/>
+      </p:ext>
+    </p:extLst>
+  </p:cSld>
+  <p:clrMapOvr>
+    <a:masterClrMapping/>
+  </p:clrMapOvr>
+</p:sld>
+</file>
+
+<file path=ppt/slides/slide5.xml><?xml version="1.0" encoding="utf-8"?>
+<p:sld xmlns:a="http://schemas.openxmlformats.org/drawingml/2006/main" xmlns:r="http://schemas.openxmlformats.org/officeDocument/2006/relationships" xmlns:p="http://schemas.openxmlformats.org/presentationml/2006/main">
+  <p:cSld>
+    <p:spTree>
+      <p:nvGrpSpPr>
+        <p:cNvPr id="1" name=""/>
+        <p:cNvGrpSpPr/>
+        <p:nvPr/>
+      </p:nvGrpSpPr>
+      <p:grpSpPr>
+        <a:xfrm>
+          <a:off x="0" y="0"/>
+          <a:ext cx="0" cy="0"/>
+          <a:chOff x="0" y="0"/>
+          <a:chExt cx="0" cy="0"/>
+        </a:xfrm>
+      </p:grpSpPr>
+      <p:sp>
+        <p:nvSpPr>
+          <p:cNvPr id="3" name="Объект 2">
+            <a:extLst>
+              <a:ext uri="{FF2B5EF4-FFF2-40B4-BE49-F238E27FC236}">
+                <a16:creationId xmlns:a16="http://schemas.microsoft.com/office/drawing/2014/main" id="{BB7D30FD-6CA2-4B40-9DB4-F14D6EC1992B}"/>
+              </a:ext>
+            </a:extLst>
+          </p:cNvPr>
+          <p:cNvSpPr>
+            <a:spLocks noGrp="1"/>
+          </p:cNvSpPr>
+          <p:nvPr>
+            <p:ph sz="quarter" idx="13"/>
+          </p:nvPr>
+        </p:nvSpPr>
+        <p:spPr>
+          <a:xfrm>
+            <a:off x="149576" y="4323644"/>
+            <a:ext cx="8994423" cy="2534356"/>
+          </a:xfrm>
+        </p:spPr>
+        <p:txBody>
+          <a:bodyPr>
+            <a:normAutofit fontScale="70000" lnSpcReduction="20000"/>
+          </a:bodyPr>
+          <a:lstStyle/>
+          <a:p>
+            <a:pPr algn="just"/>
+            <a:r>
+              <a:rPr lang="ru-RU" dirty="0"/>
+              <a:t>Предполагается заданным раскройный план, предусматривающий резку тридцати контуров у 16 деталей; итак, в данном примере </a:t>
+            </a:r>
+            <a:r>
+              <a:rPr lang="ru-RU" i="1" dirty="0"/>
+              <a:t>N </a:t>
+            </a:r>
+            <a:r>
+              <a:rPr lang="ru-RU" dirty="0"/>
+              <a:t>= 30. Полезно ввести специальное понятие порта, включая в это понятие триплет, содержащий точку врезки, соответствующую ей точку выключения инструмента, а также точку начала реза. Точка выключения инструмента близка к точке врезки. В примере предполагается, что общее число точек врезки (по всем контурам) равно 508. Количество адресных пар, определяющих  условия предшествования в данном примере равно 20. Имеются в виду пары индексов мегаполисов (по смыслу «отправитель» и «получатель»; условия предшествования предполагают перемещение во времени только в направлении от «отправителя» к «получателю»). Имеются в виду оговоренные в предыдущем разделе условия, связывающие резку внутренних контуров (и «внутренних» деталей) и резку внешнего контура у каждой детали. </a:t>
+            </a:r>
+          </a:p>
+        </p:txBody>
+      </p:sp>
+      <p:sp>
+        <p:nvSpPr>
+          <p:cNvPr id="4" name="TextBox 3">
+            <a:extLst>
+              <a:ext uri="{FF2B5EF4-FFF2-40B4-BE49-F238E27FC236}">
+                <a16:creationId xmlns:a16="http://schemas.microsoft.com/office/drawing/2014/main" id="{E1EB8735-8E4C-4C14-8B12-A4113CFE3C35}"/>
+              </a:ext>
+            </a:extLst>
+          </p:cNvPr>
+          <p:cNvSpPr txBox="1"/>
+          <p:nvPr/>
+        </p:nvSpPr>
+        <p:spPr>
+          <a:xfrm>
+            <a:off x="3821502" y="219759"/>
+            <a:ext cx="5070978" cy="646331"/>
+          </a:xfrm>
+          <a:prstGeom prst="rect">
+            <a:avLst/>
+          </a:prstGeom>
+          <a:noFill/>
+        </p:spPr>
+        <p:txBody>
+          <a:bodyPr wrap="square" rtlCol="0">
+            <a:spAutoFit/>
+            <a:scene3d>
+              <a:camera prst="orthographicFront"/>
+              <a:lightRig rig="soft" dir="tl">
+                <a:rot lat="0" lon="0" rev="0"/>
+              </a:lightRig>
+            </a:scene3d>
+            <a:sp3d contourW="25400" prstMaterial="matte">
+              <a:bevelT w="25400" h="55880" prst="artDeco"/>
+              <a:contourClr>
+                <a:schemeClr val="accent2">
+                  <a:tint val="20000"/>
+                </a:schemeClr>
+              </a:contourClr>
+            </a:sp3d>
+          </a:bodyPr>
+          <a:lstStyle/>
+          <a:p>
+            <a:pPr algn="r"/>
+            <a:r>
+              <a:rPr lang="ru-RU" sz="3600" b="1" spc="50" dirty="0">
+                <a:ln w="11430"/>
+                <a:gradFill>
+                  <a:gsLst>
+                    <a:gs pos="25000">
+                      <a:schemeClr val="accent2">
+                        <a:satMod val="155000"/>
+                      </a:schemeClr>
+                    </a:gs>
+                    <a:gs pos="100000">
+                      <a:schemeClr val="accent2">
+                        <a:shade val="45000"/>
+                        <a:satMod val="165000"/>
+                      </a:schemeClr>
+                    </a:gs>
+                  </a:gsLst>
+                  <a:lin ang="5400000"/>
+                </a:gradFill>
+                <a:effectLst>
+                  <a:outerShdw blurRad="76200" dist="50800" dir="5400000" algn="tl" rotWithShape="0">
+                    <a:srgbClr val="000000">
+                      <a:alpha val="65000"/>
+                    </a:srgbClr>
+                  </a:outerShdw>
+                </a:effectLst>
+              </a:rPr>
+              <a:t>Модельный пример</a:t>
+            </a:r>
+          </a:p>
+        </p:txBody>
+      </p:sp>
+      <p:pic>
+        <p:nvPicPr>
+          <p:cNvPr id="5" name="image1.png">
+            <a:extLst>
+              <a:ext uri="{FF2B5EF4-FFF2-40B4-BE49-F238E27FC236}">
+                <a16:creationId xmlns:a16="http://schemas.microsoft.com/office/drawing/2014/main" id="{B85C4435-1DA6-4578-B35B-08448D3E7B97}"/>
+              </a:ext>
+            </a:extLst>
+          </p:cNvPr>
+          <p:cNvPicPr/>
+          <p:nvPr/>
+        </p:nvPicPr>
+        <p:blipFill>
+          <a:blip r:embed="rId2" cstate="print"/>
+          <a:stretch>
+            <a:fillRect/>
+          </a:stretch>
+        </p:blipFill>
+        <p:spPr>
+          <a:xfrm>
+            <a:off x="1679355" y="897091"/>
+            <a:ext cx="5934863" cy="2983421"/>
+          </a:xfrm>
+          <a:prstGeom prst="rect">
+            <a:avLst/>
+          </a:prstGeom>
+        </p:spPr>
+      </p:pic>
+    </p:spTree>
+    <p:extLst>
+      <p:ext uri="{BB962C8B-B14F-4D97-AF65-F5344CB8AC3E}">
+        <p14:creationId xmlns:p14="http://schemas.microsoft.com/office/powerpoint/2010/main" val="3422736726"/>
+      </p:ext>
+    </p:extLst>
+  </p:cSld>
+  <p:clrMapOvr>
+    <a:masterClrMapping/>
+  </p:clrMapOvr>
+</p:sld>
+</file>
+
+<file path=ppt/slides/slide6.xml><?xml version="1.0" encoding="utf-8"?>
+<p:sld xmlns:a="http://schemas.openxmlformats.org/drawingml/2006/main" xmlns:r="http://schemas.openxmlformats.org/officeDocument/2006/relationships" xmlns:p="http://schemas.openxmlformats.org/presentationml/2006/main">
+  <p:cSld>
+    <p:spTree>
+      <p:nvGrpSpPr>
+        <p:cNvPr id="1" name=""/>
+        <p:cNvGrpSpPr/>
+        <p:nvPr/>
+      </p:nvGrpSpPr>
+      <p:grpSpPr>
+        <a:xfrm>
+          <a:off x="0" y="0"/>
+          <a:ext cx="0" cy="0"/>
+          <a:chOff x="0" y="0"/>
+          <a:chExt cx="0" cy="0"/>
+        </a:xfrm>
+      </p:grpSpPr>
+      <p:sp>
+        <p:nvSpPr>
+          <p:cNvPr id="3" name="Объект 2">
+            <a:extLst>
+              <a:ext uri="{FF2B5EF4-FFF2-40B4-BE49-F238E27FC236}">
+                <a16:creationId xmlns:a16="http://schemas.microsoft.com/office/drawing/2014/main" id="{20477A3A-F003-4F11-B65D-9DEC1EBEA3EA}"/>
+              </a:ext>
+            </a:extLst>
+          </p:cNvPr>
+          <p:cNvSpPr>
+            <a:spLocks noGrp="1"/>
+          </p:cNvSpPr>
+          <p:nvPr>
+            <p:ph sz="quarter" idx="13"/>
+          </p:nvPr>
+        </p:nvSpPr>
+        <p:spPr>
+          <a:xfrm>
+            <a:off x="262466" y="1038578"/>
+            <a:ext cx="8779933" cy="5723466"/>
+          </a:xfrm>
+        </p:spPr>
+        <p:txBody>
+          <a:bodyPr>
+            <a:normAutofit fontScale="77500" lnSpcReduction="20000"/>
+          </a:bodyPr>
+          <a:lstStyle/>
+          <a:p>
+            <a:pPr algn="just"/>
+            <a:r>
+              <a:rPr lang="ru-RU" dirty="0"/>
+              <a:t>Для проведения вычислений использовался компьютер с процессором </a:t>
+            </a:r>
+            <a:r>
+              <a:rPr lang="ru-RU" dirty="0" err="1"/>
+              <a:t>Intel</a:t>
+            </a:r>
+            <a:r>
+              <a:rPr lang="ru-RU" dirty="0"/>
+              <a:t> i7-2630QM и 8 Гб оперативной памяти, работающий под управлением </a:t>
+            </a:r>
+            <a:r>
+              <a:rPr lang="ru-RU" dirty="0" err="1"/>
+              <a:t>Windows</a:t>
+            </a:r>
+            <a:r>
+              <a:rPr lang="ru-RU" dirty="0"/>
+              <a:t> 7 (64-bit). Программа разработана на языке C++, скомпилирована при помощи компилятора </a:t>
+            </a:r>
+            <a:r>
+              <a:rPr lang="ru-RU" dirty="0" err="1"/>
+              <a:t>MinGW</a:t>
+            </a:r>
+            <a:r>
+              <a:rPr lang="ru-RU" dirty="0"/>
+              <a:t> с использованием библиотеки </a:t>
+            </a:r>
+            <a:r>
+              <a:rPr lang="ru-RU" dirty="0" err="1"/>
+              <a:t>Qt</a:t>
+            </a:r>
+            <a:r>
+              <a:rPr lang="ru-RU" dirty="0"/>
+              <a:t>. Мегаполисы конструируются из точек врезки и точек выключения инструмента. Их упорядоченные пары образуют отношения, т.е. множества упорядоченных пар. Вместе с тем, с каждым мегаполисом удобно связать сейчас набор портов. Предполагается, что минимальное количество портов для мегаполиса равно 4 (при этом число «городов» мегаполиса равно 8), а максимальное количество портов для мегаполиса равно 34. Количество возможных точек старта (мощность множества упомянутого множества) равно 58. Они расположены на сторонах исходного прямоугольника с координатами углов (0,0), (0,1000), (1900,1000), (1900,0) равномерно с шагом 100 (по часовой стрелке). Точка финиша имеет координаты (0, 0). Все размеры даны в миллиметрах. Скорость холостого хода 500 мм/с, скорость реза 10 мм/с. </a:t>
+            </a:r>
+          </a:p>
+          <a:p>
+            <a:pPr algn="just"/>
+            <a:r>
+              <a:rPr lang="ru-RU" dirty="0"/>
+              <a:t>Предполагается, что внутренние работы определяются суммой времен перемещения в режиме реза (рабочего хода) от точки врезки до точки начала реза и от этой последней точки до точки выключения инструмента, а также значения штрафной функции. Для штрафной функции длина области завершения реза имеет значение 100 мм, ширина – 25 мм, пороговое значение 0,25. Если больше 25% площади области завершения реза приходится на пустоты в металле или на пространство за пределами листа, то штрафная функция имеет значение 1000000, иначе 0.</a:t>
+            </a:r>
+          </a:p>
+          <a:p>
+            <a:pPr algn="just"/>
+            <a:r>
+              <a:rPr lang="ru-RU" dirty="0"/>
+              <a:t>В ходе счета получено значение экстремума 67,555. Время счета 51 мин. 58 сек. Координаты точки старта (1600 мм, 0 мм).</a:t>
+            </a:r>
+          </a:p>
+        </p:txBody>
+      </p:sp>
+      <p:sp>
+        <p:nvSpPr>
+          <p:cNvPr id="4" name="TextBox 3">
+            <a:extLst>
+              <a:ext uri="{FF2B5EF4-FFF2-40B4-BE49-F238E27FC236}">
+                <a16:creationId xmlns:a16="http://schemas.microsoft.com/office/drawing/2014/main" id="{6C792228-994B-4231-8FF4-3BEC05F32CCC}"/>
+              </a:ext>
+            </a:extLst>
+          </p:cNvPr>
+          <p:cNvSpPr txBox="1"/>
+          <p:nvPr/>
+        </p:nvSpPr>
+        <p:spPr>
+          <a:xfrm>
+            <a:off x="3821502" y="219759"/>
+            <a:ext cx="5070978" cy="646331"/>
+          </a:xfrm>
+          <a:prstGeom prst="rect">
+            <a:avLst/>
+          </a:prstGeom>
+          <a:noFill/>
+        </p:spPr>
+        <p:txBody>
+          <a:bodyPr wrap="square" rtlCol="0">
+            <a:spAutoFit/>
+            <a:scene3d>
+              <a:camera prst="orthographicFront"/>
+              <a:lightRig rig="soft" dir="tl">
+                <a:rot lat="0" lon="0" rev="0"/>
+              </a:lightRig>
+            </a:scene3d>
+            <a:sp3d contourW="25400" prstMaterial="matte">
+              <a:bevelT w="25400" h="55880" prst="artDeco"/>
+              <a:contourClr>
+                <a:schemeClr val="accent2">
+                  <a:tint val="20000"/>
+                </a:schemeClr>
+              </a:contourClr>
+            </a:sp3d>
+          </a:bodyPr>
+          <a:lstStyle/>
+          <a:p>
+            <a:pPr algn="r"/>
+            <a:r>
+              <a:rPr lang="ru-RU" sz="3600" b="1" spc="50" dirty="0">
+                <a:ln w="11430"/>
+                <a:gradFill>
+                  <a:gsLst>
+                    <a:gs pos="25000">
+                      <a:schemeClr val="accent2">
+                        <a:satMod val="155000"/>
+                      </a:schemeClr>
+                    </a:gs>
+                    <a:gs pos="100000">
+                      <a:schemeClr val="accent2">
+                        <a:shade val="45000"/>
+                        <a:satMod val="165000"/>
+                      </a:schemeClr>
+                    </a:gs>
+                  </a:gsLst>
+                  <a:lin ang="5400000"/>
+                </a:gradFill>
+                <a:effectLst>
+                  <a:outerShdw blurRad="76200" dist="50800" dir="5400000" algn="tl" rotWithShape="0">
+                    <a:srgbClr val="000000">
+                      <a:alpha val="65000"/>
+                    </a:srgbClr>
+                  </a:outerShdw>
+                </a:effectLst>
+              </a:rPr>
+              <a:t>Модельный пример</a:t>
+            </a:r>
+          </a:p>
+        </p:txBody>
+      </p:sp>
+    </p:spTree>
+    <p:extLst>
+      <p:ext uri="{BB962C8B-B14F-4D97-AF65-F5344CB8AC3E}">
+        <p14:creationId xmlns:p14="http://schemas.microsoft.com/office/powerpoint/2010/main" val="3241342133"/>
+      </p:ext>
+    </p:extLst>
+  </p:cSld>
+  <p:clrMapOvr>
+    <a:masterClrMapping/>
+  </p:clrMapOvr>
+</p:sld>
+</file>
+
+<file path=ppt/slides/slide7.xml><?xml version="1.0" encoding="utf-8"?>
+<p:sld xmlns:a="http://schemas.openxmlformats.org/drawingml/2006/main" xmlns:r="http://schemas.openxmlformats.org/officeDocument/2006/relationships" xmlns:p="http://schemas.openxmlformats.org/presentationml/2006/main">
+  <p:cSld>
+    <p:spTree>
+      <p:nvGrpSpPr>
+        <p:cNvPr id="1" name=""/>
+        <p:cNvGrpSpPr/>
+        <p:nvPr/>
+      </p:nvGrpSpPr>
+      <p:grpSpPr>
+        <a:xfrm>
+          <a:off x="0" y="0"/>
+          <a:ext cx="0" cy="0"/>
+          <a:chOff x="0" y="0"/>
+          <a:chExt cx="0" cy="0"/>
+        </a:xfrm>
+      </p:grpSpPr>
+      <p:sp>
+        <p:nvSpPr>
+          <p:cNvPr id="3" name="Объект 2">
+            <a:extLst>
+              <a:ext uri="{FF2B5EF4-FFF2-40B4-BE49-F238E27FC236}">
+                <a16:creationId xmlns:a16="http://schemas.microsoft.com/office/drawing/2014/main" id="{31B01078-A32E-4632-961A-CAEAAA62E848}"/>
+              </a:ext>
+            </a:extLst>
+          </p:cNvPr>
+          <p:cNvSpPr>
+            <a:spLocks noGrp="1"/>
+          </p:cNvSpPr>
+          <p:nvPr>
+            <p:ph sz="quarter" idx="13"/>
+          </p:nvPr>
+        </p:nvSpPr>
+        <p:spPr>
+          <a:xfrm>
+            <a:off x="57784" y="3459666"/>
+            <a:ext cx="8939460" cy="3098517"/>
+          </a:xfrm>
+        </p:spPr>
+        <p:txBody>
+          <a:bodyPr>
+            <a:normAutofit fontScale="77500" lnSpcReduction="20000"/>
+          </a:bodyPr>
+          <a:lstStyle/>
+          <a:p>
+            <a:r>
+              <a:rPr lang="ru-RU" dirty="0"/>
+              <a:t>Модель мегаполисов применима и при использовании нестандартных техник резки, в частности, т.н. мульти-контурной резки, которая предполагает использование только одной точки врезки для вырезки двух и более контуров внутри одного сегмента резки. Под сегментом резки подразумевается траектория рабочего хода инструмента между точкой врезки и соответствующей ей точкой выключения инструмента. </a:t>
+            </a:r>
+          </a:p>
+          <a:p>
+            <a:r>
+              <a:rPr lang="ru-RU" dirty="0"/>
+              <a:t>Следует отметить, что описанная математическая модель позволяет получать на обычном персональном компьютере точные варианты решения для задач маршрутизации инструмента машин листовой резки с ЧПУ для раскройных карт, содержащих 30 и более деталей. Заметим также, что применение алгоритмов, которые бы обеспечивали достижение глобального экстремума при решении подобных задач реальной размерности, не описано в научных публикациях. </a:t>
+            </a:r>
+          </a:p>
+          <a:p>
+            <a:pPr marL="45720" indent="0">
+              <a:buNone/>
+            </a:pPr>
+            <a:endParaRPr lang="ru-RU" dirty="0"/>
+          </a:p>
+        </p:txBody>
+      </p:sp>
+      <p:sp>
+        <p:nvSpPr>
+          <p:cNvPr id="4" name="TextBox 3">
+            <a:extLst>
+              <a:ext uri="{FF2B5EF4-FFF2-40B4-BE49-F238E27FC236}">
+                <a16:creationId xmlns:a16="http://schemas.microsoft.com/office/drawing/2014/main" id="{767CFD91-2EE3-4A03-BBE0-706333EBFF99}"/>
+              </a:ext>
+            </a:extLst>
+          </p:cNvPr>
+          <p:cNvSpPr txBox="1"/>
+          <p:nvPr/>
+        </p:nvSpPr>
+        <p:spPr>
+          <a:xfrm>
+            <a:off x="3821502" y="219759"/>
+            <a:ext cx="5070978" cy="646331"/>
+          </a:xfrm>
+          <a:prstGeom prst="rect">
+            <a:avLst/>
+          </a:prstGeom>
+          <a:noFill/>
+        </p:spPr>
+        <p:txBody>
+          <a:bodyPr wrap="square" rtlCol="0">
+            <a:spAutoFit/>
+            <a:scene3d>
+              <a:camera prst="orthographicFront"/>
+              <a:lightRig rig="soft" dir="tl">
+                <a:rot lat="0" lon="0" rev="0"/>
+              </a:lightRig>
+            </a:scene3d>
+            <a:sp3d contourW="25400" prstMaterial="matte">
+              <a:bevelT w="25400" h="55880" prst="artDeco"/>
+              <a:contourClr>
+                <a:schemeClr val="accent2">
+                  <a:tint val="20000"/>
+                </a:schemeClr>
+              </a:contourClr>
+            </a:sp3d>
+          </a:bodyPr>
+          <a:lstStyle/>
+          <a:p>
+            <a:pPr algn="r"/>
+            <a:r>
+              <a:rPr lang="ru-RU" sz="3600" b="1" spc="50" dirty="0">
+                <a:ln w="11430"/>
+                <a:gradFill>
+                  <a:gsLst>
+                    <a:gs pos="25000">
+                      <a:schemeClr val="accent2">
+                        <a:satMod val="155000"/>
+                      </a:schemeClr>
+                    </a:gs>
+                    <a:gs pos="100000">
+                      <a:schemeClr val="accent2">
+                        <a:shade val="45000"/>
+                        <a:satMod val="165000"/>
+                      </a:schemeClr>
+                    </a:gs>
+                  </a:gsLst>
+                  <a:lin ang="5400000"/>
+                </a:gradFill>
+                <a:effectLst>
+                  <a:outerShdw blurRad="76200" dist="50800" dir="5400000" algn="tl" rotWithShape="0">
+                    <a:srgbClr val="000000">
+                      <a:alpha val="65000"/>
+                    </a:srgbClr>
+                  </a:outerShdw>
+                </a:effectLst>
+              </a:rPr>
+              <a:t>Модельный пример</a:t>
+            </a:r>
+          </a:p>
+        </p:txBody>
+      </p:sp>
+      <p:pic>
+        <p:nvPicPr>
+          <p:cNvPr id="5" name="image2.png">
+            <a:extLst>
+              <a:ext uri="{FF2B5EF4-FFF2-40B4-BE49-F238E27FC236}">
+                <a16:creationId xmlns:a16="http://schemas.microsoft.com/office/drawing/2014/main" id="{18AF445E-4E6C-4A05-982A-CF0DFD63A224}"/>
+              </a:ext>
+            </a:extLst>
+          </p:cNvPr>
+          <p:cNvPicPr/>
+          <p:nvPr/>
+        </p:nvPicPr>
+        <p:blipFill>
+          <a:blip r:embed="rId2" cstate="print"/>
+          <a:stretch>
+            <a:fillRect/>
+          </a:stretch>
+        </p:blipFill>
+        <p:spPr>
+          <a:xfrm>
+            <a:off x="146756" y="179869"/>
+            <a:ext cx="4048986" cy="2940474"/>
+          </a:xfrm>
+          <a:prstGeom prst="rect">
+            <a:avLst/>
+          </a:prstGeom>
+        </p:spPr>
+      </p:pic>
+      <p:sp>
+        <p:nvSpPr>
+          <p:cNvPr id="6" name="Объект 2">
+            <a:extLst>
+              <a:ext uri="{FF2B5EF4-FFF2-40B4-BE49-F238E27FC236}">
+                <a16:creationId xmlns:a16="http://schemas.microsoft.com/office/drawing/2014/main" id="{99EAA932-B7E4-4E71-A0CB-F0B6F425357A}"/>
+              </a:ext>
+            </a:extLst>
+          </p:cNvPr>
+          <p:cNvSpPr txBox="1">
+            <a:spLocks/>
+          </p:cNvSpPr>
+          <p:nvPr/>
+        </p:nvSpPr>
+        <p:spPr>
+          <a:xfrm>
+            <a:off x="4287960" y="1205413"/>
+            <a:ext cx="4526844" cy="1363841"/>
+          </a:xfrm>
+          <a:prstGeom prst="rect">
+            <a:avLst/>
+          </a:prstGeom>
+        </p:spPr>
+        <p:txBody>
+          <a:bodyPr vert="horz" lIns="91440" tIns="45720" rIns="91440" bIns="45720" rtlCol="0">
+            <a:normAutofit fontScale="62500" lnSpcReduction="20000"/>
+          </a:bodyPr>
+          <a:lstStyle>
+            <a:lvl1pPr marL="228600" indent="-182880" algn="l" defTabSz="914400" rtl="0" eaLnBrk="1" latinLnBrk="0" hangingPunct="1">
+              <a:spcBef>
+                <a:spcPct val="20000"/>
+              </a:spcBef>
+              <a:spcAft>
+                <a:spcPts val="300"/>
+              </a:spcAft>
+              <a:buClr>
+                <a:schemeClr val="accent6">
+                  <a:lumMod val="75000"/>
+                </a:schemeClr>
+              </a:buClr>
+              <a:buSzPct val="130000"/>
+              <a:buFont typeface="Georgia" pitchFamily="18" charset="0"/>
+              <a:buChar char="*"/>
+              <a:defRPr sz="2200" kern="1200">
+                <a:solidFill>
+                  <a:schemeClr val="tx1">
+                    <a:lumMod val="75000"/>
+                    <a:lumOff val="25000"/>
+                  </a:schemeClr>
+                </a:solidFill>
+                <a:latin typeface="+mn-lt"/>
+                <a:ea typeface="+mn-ea"/>
+                <a:cs typeface="+mn-cs"/>
+              </a:defRPr>
+            </a:lvl1pPr>
+            <a:lvl2pPr marL="548640" indent="-182880" algn="l" defTabSz="914400" rtl="0" eaLnBrk="1" latinLnBrk="0" hangingPunct="1">
+              <a:spcBef>
+                <a:spcPct val="20000"/>
+              </a:spcBef>
+              <a:spcAft>
+                <a:spcPts val="300"/>
+              </a:spcAft>
+              <a:buClr>
+                <a:schemeClr val="accent6">
+                  <a:lumMod val="75000"/>
+                </a:schemeClr>
+              </a:buClr>
+              <a:buSzPct val="130000"/>
+              <a:buFont typeface="Georgia" pitchFamily="18" charset="0"/>
+              <a:buChar char="*"/>
+              <a:defRPr sz="2000" kern="1200">
+                <a:solidFill>
+                  <a:schemeClr val="tx1">
+                    <a:lumMod val="75000"/>
+                    <a:lumOff val="25000"/>
+                  </a:schemeClr>
+                </a:solidFill>
+                <a:latin typeface="+mn-lt"/>
+                <a:ea typeface="+mn-ea"/>
+                <a:cs typeface="+mn-cs"/>
+              </a:defRPr>
+            </a:lvl2pPr>
+            <a:lvl3pPr marL="822960" indent="-182880" algn="l" defTabSz="914400" rtl="0" eaLnBrk="1" latinLnBrk="0" hangingPunct="1">
+              <a:spcBef>
+                <a:spcPct val="20000"/>
+              </a:spcBef>
+              <a:spcAft>
+                <a:spcPts val="300"/>
+              </a:spcAft>
+              <a:buClr>
+                <a:schemeClr val="accent6">
+                  <a:lumMod val="75000"/>
+                </a:schemeClr>
+              </a:buClr>
+              <a:buSzPct val="130000"/>
+              <a:buFont typeface="Georgia" pitchFamily="18" charset="0"/>
+              <a:buChar char="*"/>
+              <a:defRPr sz="1800" kern="1200">
+                <a:solidFill>
+                  <a:schemeClr val="tx1">
+                    <a:lumMod val="75000"/>
+                    <a:lumOff val="25000"/>
+                  </a:schemeClr>
+                </a:solidFill>
+                <a:latin typeface="+mn-lt"/>
+                <a:ea typeface="+mn-ea"/>
+                <a:cs typeface="+mn-cs"/>
+              </a:defRPr>
+            </a:lvl3pPr>
+            <a:lvl4pPr marL="1097280" indent="-182880" algn="l" defTabSz="914400" rtl="0" eaLnBrk="1" latinLnBrk="0" hangingPunct="1">
+              <a:spcBef>
+                <a:spcPct val="20000"/>
+              </a:spcBef>
+              <a:spcAft>
+                <a:spcPts val="300"/>
+              </a:spcAft>
+              <a:buClr>
+                <a:schemeClr val="accent6">
+                  <a:lumMod val="75000"/>
+                </a:schemeClr>
+              </a:buClr>
+              <a:buSzPct val="130000"/>
+              <a:buFont typeface="Georgia" pitchFamily="18" charset="0"/>
+              <a:buChar char="*"/>
+              <a:defRPr sz="1600" kern="1200">
+                <a:solidFill>
+                  <a:schemeClr val="tx1">
+                    <a:lumMod val="75000"/>
+                    <a:lumOff val="25000"/>
+                  </a:schemeClr>
+                </a:solidFill>
+                <a:latin typeface="+mn-lt"/>
+                <a:ea typeface="+mn-ea"/>
+                <a:cs typeface="+mn-cs"/>
+              </a:defRPr>
+            </a:lvl4pPr>
+            <a:lvl5pPr marL="1389888" indent="-182880" algn="l" defTabSz="914400" rtl="0" eaLnBrk="1" latinLnBrk="0" hangingPunct="1">
+              <a:spcBef>
+                <a:spcPct val="20000"/>
+              </a:spcBef>
+              <a:spcAft>
+                <a:spcPts val="300"/>
+              </a:spcAft>
+              <a:buClr>
+                <a:schemeClr val="accent6">
+                  <a:lumMod val="75000"/>
+                </a:schemeClr>
+              </a:buClr>
+              <a:buSzPct val="130000"/>
+              <a:buFont typeface="Georgia" pitchFamily="18" charset="0"/>
+              <a:buChar char="*"/>
+              <a:defRPr sz="1400" kern="1200">
+                <a:solidFill>
+                  <a:schemeClr val="tx1">
+                    <a:lumMod val="75000"/>
+                    <a:lumOff val="25000"/>
+                  </a:schemeClr>
+                </a:solidFill>
+                <a:latin typeface="+mn-lt"/>
+                <a:ea typeface="+mn-ea"/>
+                <a:cs typeface="+mn-cs"/>
+              </a:defRPr>
+            </a:lvl5pPr>
+            <a:lvl6pPr marL="1664208" indent="-182880" algn="l" defTabSz="914400" rtl="0" eaLnBrk="1" latinLnBrk="0" hangingPunct="1">
+              <a:spcBef>
+                <a:spcPct val="20000"/>
+              </a:spcBef>
+              <a:spcAft>
+                <a:spcPts val="300"/>
+              </a:spcAft>
+              <a:buClr>
+                <a:schemeClr val="accent6">
+                  <a:lumMod val="75000"/>
+                </a:schemeClr>
+              </a:buClr>
+              <a:buSzPct val="130000"/>
+              <a:buFont typeface="Georgia" pitchFamily="18" charset="0"/>
+              <a:buChar char="*"/>
+              <a:defRPr sz="1400" kern="1200">
+                <a:solidFill>
+                  <a:schemeClr val="tx1">
+                    <a:lumMod val="75000"/>
+                    <a:lumOff val="25000"/>
+                  </a:schemeClr>
+                </a:solidFill>
+                <a:latin typeface="+mn-lt"/>
+                <a:ea typeface="+mn-ea"/>
+                <a:cs typeface="+mn-cs"/>
+              </a:defRPr>
+            </a:lvl6pPr>
+            <a:lvl7pPr marL="1965960" indent="-182880" algn="l" defTabSz="914400" rtl="0" eaLnBrk="1" latinLnBrk="0" hangingPunct="1">
+              <a:spcBef>
+                <a:spcPct val="20000"/>
+              </a:spcBef>
+              <a:spcAft>
+                <a:spcPts val="300"/>
+              </a:spcAft>
+              <a:buClr>
+                <a:schemeClr val="accent6">
+                  <a:lumMod val="75000"/>
+                </a:schemeClr>
+              </a:buClr>
+              <a:buSzPct val="130000"/>
+              <a:buFont typeface="Georgia" pitchFamily="18" charset="0"/>
+              <a:buChar char="*"/>
+              <a:defRPr sz="1400" kern="1200">
+                <a:solidFill>
+                  <a:schemeClr val="tx1">
+                    <a:lumMod val="75000"/>
+                    <a:lumOff val="25000"/>
+                  </a:schemeClr>
+                </a:solidFill>
+                <a:latin typeface="+mn-lt"/>
+                <a:ea typeface="+mn-ea"/>
+                <a:cs typeface="+mn-cs"/>
+              </a:defRPr>
+            </a:lvl7pPr>
+            <a:lvl8pPr marL="2286000" indent="-182880" algn="l" defTabSz="914400" rtl="0" eaLnBrk="1" latinLnBrk="0" hangingPunct="1">
+              <a:spcBef>
+                <a:spcPct val="20000"/>
+              </a:spcBef>
+              <a:spcAft>
+                <a:spcPts val="300"/>
+              </a:spcAft>
+              <a:buClr>
+                <a:schemeClr val="accent6">
+                  <a:lumMod val="75000"/>
+                </a:schemeClr>
+              </a:buClr>
+              <a:buSzPct val="130000"/>
+              <a:buFont typeface="Georgia" pitchFamily="18" charset="0"/>
+              <a:buChar char="*"/>
+              <a:defRPr sz="1400" kern="1200">
+                <a:solidFill>
+                  <a:schemeClr val="tx1">
+                    <a:lumMod val="75000"/>
+                    <a:lumOff val="25000"/>
+                  </a:schemeClr>
+                </a:solidFill>
+                <a:latin typeface="+mn-lt"/>
+                <a:ea typeface="+mn-ea"/>
+                <a:cs typeface="+mn-cs"/>
+              </a:defRPr>
+            </a:lvl8pPr>
+            <a:lvl9pPr marL="2587752" indent="-182880" algn="l" defTabSz="914400" rtl="0" eaLnBrk="1" latinLnBrk="0" hangingPunct="1">
+              <a:spcBef>
+                <a:spcPct val="20000"/>
+              </a:spcBef>
+              <a:spcAft>
+                <a:spcPts val="300"/>
+              </a:spcAft>
+              <a:buClr>
+                <a:schemeClr val="accent6">
+                  <a:lumMod val="75000"/>
+                </a:schemeClr>
+              </a:buClr>
+              <a:buSzPct val="130000"/>
+              <a:buFont typeface="Georgia" pitchFamily="18" charset="0"/>
+              <a:buChar char="*"/>
+              <a:defRPr sz="1400" kern="1200">
+                <a:solidFill>
+                  <a:schemeClr val="tx1">
+                    <a:lumMod val="75000"/>
+                    <a:lumOff val="25000"/>
+                  </a:schemeClr>
+                </a:solidFill>
+                <a:latin typeface="+mn-lt"/>
+                <a:ea typeface="+mn-ea"/>
+                <a:cs typeface="+mn-cs"/>
+              </a:defRPr>
+            </a:lvl9pPr>
+          </a:lstStyle>
+          <a:p>
+            <a:pPr marL="45720" indent="0" algn="just">
+              <a:buNone/>
+            </a:pPr>
+            <a:r>
+              <a:rPr lang="ru-RU" i="1" dirty="0"/>
+              <a:t>Пример расчета оптимальной траектории инструмента при резке 19 деталей, заданных 24-мя контурами. Для пар деталей, отмеченных цифрами 1–2, 3–4, 5–6 были сформированы три отдельных мегаполиса, всего 21 мегаполис. Расчет оптимальной точки старта в данном примере не производился.</a:t>
+            </a:r>
+          </a:p>
+        </p:txBody>
+      </p:sp>
+    </p:spTree>
+    <p:extLst>
+      <p:ext uri="{BB962C8B-B14F-4D97-AF65-F5344CB8AC3E}">
+        <p14:creationId xmlns:p14="http://schemas.microsoft.com/office/powerpoint/2010/main" val="101075303"/>
+      </p:ext>
+    </p:extLst>
+  </p:cSld>
+  <p:clrMapOvr>
+    <a:masterClrMapping/>
+  </p:clrMapOvr>
+</p:sld>
+</file>
+
+<file path=ppt/slides/slide8.xml><?xml version="1.0" encoding="utf-8"?>
+<p:sld xmlns:a="http://schemas.openxmlformats.org/drawingml/2006/main" xmlns:r="http://schemas.openxmlformats.org/officeDocument/2006/relationships" xmlns:p="http://schemas.openxmlformats.org/presentationml/2006/main">
+  <p:cSld>
+    <p:spTree>
+      <p:nvGrpSpPr>
+        <p:cNvPr id="1" name=""/>
+        <p:cNvGrpSpPr/>
+        <p:nvPr/>
+      </p:nvGrpSpPr>
+      <p:grpSpPr>
+        <a:xfrm>
+          <a:off x="0" y="0"/>
+          <a:ext cx="0" cy="0"/>
+          <a:chOff x="0" y="0"/>
+          <a:chExt cx="0" cy="0"/>
+        </a:xfrm>
+      </p:grpSpPr>
+      <p:sp>
+        <p:nvSpPr>
+          <p:cNvPr id="3" name="Объект 2">
+            <a:extLst>
+              <a:ext uri="{FF2B5EF4-FFF2-40B4-BE49-F238E27FC236}">
+                <a16:creationId xmlns:a16="http://schemas.microsoft.com/office/drawing/2014/main" id="{F325F77E-244F-45E2-A76A-F6044791FDFF}"/>
+              </a:ext>
+            </a:extLst>
+          </p:cNvPr>
+          <p:cNvSpPr>
+            <a:spLocks noGrp="1"/>
+          </p:cNvSpPr>
+          <p:nvPr>
+            <p:ph sz="quarter" idx="13"/>
+          </p:nvPr>
+        </p:nvSpPr>
+        <p:spPr>
+          <a:xfrm>
+            <a:off x="127000" y="1307252"/>
+            <a:ext cx="8610600" cy="5195147"/>
+          </a:xfrm>
+        </p:spPr>
+        <p:txBody>
+          <a:bodyPr>
+            <a:normAutofit/>
+          </a:bodyPr>
+          <a:lstStyle/>
+          <a:p>
+            <a:pPr marL="45720" indent="0" algn="just">
+              <a:buNone/>
+            </a:pPr>
+            <a:r>
+              <a:rPr lang="ru-RU" b="1" dirty="0"/>
+              <a:t>1. Построение существенных списков заданий</a:t>
+            </a:r>
+          </a:p>
+          <a:p>
+            <a:pPr marL="45720" indent="0" algn="just">
+              <a:buNone/>
+            </a:pPr>
+            <a:r>
+              <a:rPr lang="ru-RU" dirty="0"/>
+              <a:t>Для целей снижения вычислительной сложности удается использовать условия предшествования. Реализация данной процедуры связана прежде всего с тем, что </a:t>
+            </a:r>
+            <a:r>
+              <a:rPr lang="ru-RU" dirty="0" err="1"/>
+              <a:t>насчитывание</a:t>
+            </a:r>
+            <a:r>
+              <a:rPr lang="ru-RU" dirty="0"/>
+              <a:t> всего массива значений функции Беллмана подменяется построением некоторых ее слоев и первым шагом в этом направлении является исключение из рассмотрения некоторых списков заданий. Остающиеся после данного исключения списки называем существенными; соответствующее свойство, определяющее существенность, связано с условиями предшествования. Семейства существенных списков ранжируются по мощности, получающиеся подсемейства реализуются посредством итерационной процедуры, которая доставляет все семейство существенных списков.</a:t>
+            </a:r>
+          </a:p>
+          <a:p>
+            <a:endParaRPr lang="ru-RU" dirty="0"/>
+          </a:p>
+        </p:txBody>
+      </p:sp>
+      <p:sp>
+        <p:nvSpPr>
+          <p:cNvPr id="4" name="TextBox 3">
+            <a:extLst>
+              <a:ext uri="{FF2B5EF4-FFF2-40B4-BE49-F238E27FC236}">
+                <a16:creationId xmlns:a16="http://schemas.microsoft.com/office/drawing/2014/main" id="{771DBBFA-A1F4-4A32-AB22-860D4F7F709F}"/>
+              </a:ext>
+            </a:extLst>
+          </p:cNvPr>
+          <p:cNvSpPr txBox="1"/>
+          <p:nvPr/>
+        </p:nvSpPr>
+        <p:spPr>
+          <a:xfrm>
+            <a:off x="3821502" y="219759"/>
+            <a:ext cx="5070978" cy="646331"/>
+          </a:xfrm>
+          <a:prstGeom prst="rect">
+            <a:avLst/>
+          </a:prstGeom>
+          <a:noFill/>
+        </p:spPr>
+        <p:txBody>
+          <a:bodyPr wrap="square" rtlCol="0">
+            <a:spAutoFit/>
+            <a:scene3d>
+              <a:camera prst="orthographicFront"/>
+              <a:lightRig rig="soft" dir="tl">
+                <a:rot lat="0" lon="0" rev="0"/>
+              </a:lightRig>
+            </a:scene3d>
+            <a:sp3d contourW="25400" prstMaterial="matte">
+              <a:bevelT w="25400" h="55880" prst="artDeco"/>
+              <a:contourClr>
+                <a:schemeClr val="accent2">
+                  <a:tint val="20000"/>
+                </a:schemeClr>
+              </a:contourClr>
+            </a:sp3d>
+          </a:bodyPr>
+          <a:lstStyle/>
+          <a:p>
+            <a:pPr algn="r"/>
+            <a:r>
+              <a:rPr lang="ru-RU" sz="3600" b="1" spc="50" dirty="0">
+                <a:ln w="11430"/>
+                <a:gradFill>
+                  <a:gsLst>
+                    <a:gs pos="25000">
+                      <a:schemeClr val="accent2">
+                        <a:satMod val="155000"/>
+                      </a:schemeClr>
+                    </a:gs>
+                    <a:gs pos="100000">
+                      <a:schemeClr val="accent2">
+                        <a:shade val="45000"/>
+                        <a:satMod val="165000"/>
+                      </a:schemeClr>
+                    </a:gs>
+                  </a:gsLst>
+                  <a:lin ang="5400000"/>
+                </a:gradFill>
+                <a:effectLst>
+                  <a:outerShdw blurRad="76200" dist="50800" dir="5400000" algn="tl" rotWithShape="0">
+                    <a:srgbClr val="000000">
+                      <a:alpha val="65000"/>
+                    </a:srgbClr>
+                  </a:outerShdw>
+                </a:effectLst>
+              </a:rPr>
+              <a:t>Структура алгоритма</a:t>
+            </a:r>
+          </a:p>
+        </p:txBody>
+      </p:sp>
+    </p:spTree>
+    <p:extLst>
+      <p:ext uri="{BB962C8B-B14F-4D97-AF65-F5344CB8AC3E}">
+        <p14:creationId xmlns:p14="http://schemas.microsoft.com/office/powerpoint/2010/main" val="3706291381"/>
+      </p:ext>
+    </p:extLst>
+  </p:cSld>
+  <p:clrMapOvr>
+    <a:masterClrMapping/>
+  </p:clrMapOvr>
+</p:sld>
+</file>
+
+<file path=ppt/slides/slide9.xml><?xml version="1.0" encoding="utf-8"?>
+<p:sld xmlns:a="http://schemas.openxmlformats.org/drawingml/2006/main" xmlns:r="http://schemas.openxmlformats.org/officeDocument/2006/relationships" xmlns:p="http://schemas.openxmlformats.org/presentationml/2006/main">
+  <p:cSld>
+    <p:spTree>
+      <p:nvGrpSpPr>
+        <p:cNvPr id="1" name=""/>
+        <p:cNvGrpSpPr/>
+        <p:nvPr/>
+      </p:nvGrpSpPr>
+      <p:grpSpPr>
+        <a:xfrm>
+          <a:off x="0" y="0"/>
+          <a:ext cx="0" cy="0"/>
+          <a:chOff x="0" y="0"/>
+          <a:chExt cx="0" cy="0"/>
+        </a:xfrm>
+      </p:grpSpPr>
+      <p:sp>
+        <p:nvSpPr>
+          <p:cNvPr id="3" name="Объект 2">
+            <a:extLst>
+              <a:ext uri="{FF2B5EF4-FFF2-40B4-BE49-F238E27FC236}">
+                <a16:creationId xmlns:a16="http://schemas.microsoft.com/office/drawing/2014/main" id="{F325F77E-244F-45E2-A76A-F6044791FDFF}"/>
+              </a:ext>
+            </a:extLst>
+          </p:cNvPr>
+          <p:cNvSpPr>
+            <a:spLocks noGrp="1"/>
+          </p:cNvSpPr>
+          <p:nvPr>
+            <p:ph sz="quarter" idx="13"/>
+          </p:nvPr>
+        </p:nvSpPr>
+        <p:spPr>
+          <a:xfrm>
+            <a:off x="127000" y="1307252"/>
+            <a:ext cx="8610600" cy="5195147"/>
+          </a:xfrm>
+        </p:spPr>
+        <p:txBody>
+          <a:bodyPr>
+            <a:normAutofit/>
+          </a:bodyPr>
+          <a:lstStyle/>
+          <a:p>
+            <a:pPr marL="45720" indent="0" algn="just">
+              <a:buNone/>
+            </a:pPr>
+            <a:r>
+              <a:rPr lang="ru-RU" b="1" dirty="0"/>
+              <a:t>2. Построение слоев пространства позиций</a:t>
+            </a:r>
+          </a:p>
+          <a:p>
+            <a:pPr marL="45720" indent="0" algn="just">
+              <a:buNone/>
+            </a:pPr>
+            <a:r>
+              <a:rPr lang="ru-RU" dirty="0"/>
+              <a:t>Позициями называем упорядоченные пары, элементами которых являются всякий раз состояние, определяющее положение инструмента, и список заданий, подлежащих исполнению. Позиции являются аргументами функции Беллмана (данная функция определена на пространстве позиций). В целях экономии вычислений в пространстве позиций выделяем систему взаимосвязанных   слоев и ограничиваемся использованием в качестве аргументов функции Беллмана только позиций из упомянутых слоев. </a:t>
+            </a:r>
+          </a:p>
+          <a:p>
+            <a:pPr marL="45720" indent="0" algn="just">
+              <a:buNone/>
+            </a:pPr>
+            <a:r>
+              <a:rPr lang="ru-RU" dirty="0"/>
+              <a:t>Эффект применения слоев связан с условиями предшествования. Итак, эти условия используются «в положительном направлении» в смысле снижения вычислительной сложности</a:t>
+            </a:r>
+          </a:p>
+        </p:txBody>
+      </p:sp>
+      <p:sp>
+        <p:nvSpPr>
+          <p:cNvPr id="4" name="TextBox 3">
+            <a:extLst>
+              <a:ext uri="{FF2B5EF4-FFF2-40B4-BE49-F238E27FC236}">
+                <a16:creationId xmlns:a16="http://schemas.microsoft.com/office/drawing/2014/main" id="{771DBBFA-A1F4-4A32-AB22-860D4F7F709F}"/>
+              </a:ext>
+            </a:extLst>
+          </p:cNvPr>
+          <p:cNvSpPr txBox="1"/>
+          <p:nvPr/>
+        </p:nvSpPr>
+        <p:spPr>
+          <a:xfrm>
+            <a:off x="3821502" y="219759"/>
+            <a:ext cx="5070978" cy="646331"/>
+          </a:xfrm>
+          <a:prstGeom prst="rect">
+            <a:avLst/>
+          </a:prstGeom>
+          <a:noFill/>
+        </p:spPr>
+        <p:txBody>
+          <a:bodyPr wrap="square" rtlCol="0">
+            <a:spAutoFit/>
+            <a:scene3d>
+              <a:camera prst="orthographicFront"/>
+              <a:lightRig rig="soft" dir="tl">
+                <a:rot lat="0" lon="0" rev="0"/>
+              </a:lightRig>
+            </a:scene3d>
+            <a:sp3d contourW="25400" prstMaterial="matte">
+              <a:bevelT w="25400" h="55880" prst="artDeco"/>
+              <a:contourClr>
+                <a:schemeClr val="accent2">
+                  <a:tint val="20000"/>
+                </a:schemeClr>
+              </a:contourClr>
+            </a:sp3d>
+          </a:bodyPr>
+          <a:lstStyle/>
+          <a:p>
+            <a:pPr algn="r"/>
+            <a:r>
+              <a:rPr lang="ru-RU" sz="3600" b="1" spc="50" dirty="0">
+                <a:ln w="11430"/>
+                <a:gradFill>
+                  <a:gsLst>
+                    <a:gs pos="25000">
+                      <a:schemeClr val="accent2">
+                        <a:satMod val="155000"/>
+                      </a:schemeClr>
+                    </a:gs>
+                    <a:gs pos="100000">
+                      <a:schemeClr val="accent2">
+                        <a:shade val="45000"/>
+                        <a:satMod val="165000"/>
+                      </a:schemeClr>
+                    </a:gs>
+                  </a:gsLst>
+                  <a:lin ang="5400000"/>
+                </a:gradFill>
+                <a:effectLst>
+                  <a:outerShdw blurRad="76200" dist="50800" dir="5400000" algn="tl" rotWithShape="0">
+                    <a:srgbClr val="000000">
+                      <a:alpha val="65000"/>
+                    </a:srgbClr>
+                  </a:outerShdw>
+                </a:effectLst>
+              </a:rPr>
+              <a:t>Структура алгоритма</a:t>
+            </a:r>
+          </a:p>
+        </p:txBody>
+      </p:sp>
+    </p:spTree>
+    <p:extLst>
+      <p:ext uri="{BB962C8B-B14F-4D97-AF65-F5344CB8AC3E}">
+        <p14:creationId xmlns:p14="http://schemas.microsoft.com/office/powerpoint/2010/main" val="123566270"/>
       </p:ext>
     </p:extLst>
   </p:cSld>

</xml_diff>